<commit_message>
Update 0515 project06 - 파워포인트 종합.pptx
</commit_message>
<xml_diff>
--- a/0 발표용 파워포인트/0515 2차발표/0515 project06 - 파워포인트 종합.pptx
+++ b/0 발표용 파워포인트/0515 2차발표/0515 project06 - 파워포인트 종합.pptx
@@ -39,29 +39,29 @@
   <p:notesSz cx="6858000" cy="9144000"/>
   <p:embeddedFontLst>
     <p:embeddedFont>
-      <p:font typeface="KoPub돋움체 Bold" charset="-127"/>
-      <p:bold r:id="rId29"/>
+      <p:font typeface="Microsoft New Tai Lue" pitchFamily="34" charset="0"/>
+      <p:regular r:id="rId29"/>
+      <p:bold r:id="rId30"/>
     </p:embeddedFont>
     <p:embeddedFont>
       <p:font typeface="Montserrat" charset="0"/>
-      <p:regular r:id="rId30"/>
-      <p:bold r:id="rId31"/>
-      <p:italic r:id="rId32"/>
-      <p:boldItalic r:id="rId33"/>
-    </p:embeddedFont>
-    <p:embeddedFont>
-      <p:font typeface="Microsoft New Tai Lue" pitchFamily="34" charset="0"/>
-      <p:regular r:id="rId34"/>
-      <p:bold r:id="rId35"/>
+      <p:regular r:id="rId31"/>
+      <p:bold r:id="rId32"/>
+      <p:italic r:id="rId33"/>
+      <p:boldItalic r:id="rId34"/>
     </p:embeddedFont>
     <p:embeddedFont>
       <p:font typeface="맑은 고딕" pitchFamily="50" charset="-127"/>
-      <p:regular r:id="rId36"/>
-      <p:bold r:id="rId37"/>
+      <p:regular r:id="rId35"/>
+      <p:bold r:id="rId36"/>
     </p:embeddedFont>
     <p:embeddedFont>
       <p:font typeface="나눔바른고딕" pitchFamily="50" charset="-127"/>
-      <p:regular r:id="rId38"/>
+      <p:regular r:id="rId37"/>
+      <p:bold r:id="rId38"/>
+    </p:embeddedFont>
+    <p:embeddedFont>
+      <p:font typeface="KoPub돋움체 Bold" charset="-127"/>
       <p:bold r:id="rId39"/>
     </p:embeddedFont>
   </p:embeddedFontLst>
@@ -296,7 +296,7 @@
   </p:defaultTextStyle>
   <p:extLst>
     <p:ext uri="{EFAFB233-063F-42B5-8137-9DF3F51BA10A}">
-      <p15:sldGuideLst xmlns:p15="http://schemas.microsoft.com/office/powerpoint/2012/main" xmlns="">
+      <p15:sldGuideLst xmlns="" xmlns:p15="http://schemas.microsoft.com/office/powerpoint/2012/main">
         <p15:guide id="1" orient="horz" pos="1620">
           <p15:clr>
             <a:srgbClr val="A4A3A4"/>
@@ -310,7 +310,7 @@
       </p15:sldGuideLst>
     </p:ext>
     <p:ext uri="{2D200454-40CA-4A62-9FC3-DE9A4176ACB9}">
-      <p15:notesGuideLst xmlns:p15="http://schemas.microsoft.com/office/powerpoint/2012/main" xmlns="">
+      <p15:notesGuideLst xmlns="" xmlns:p15="http://schemas.microsoft.com/office/powerpoint/2012/main">
         <p15:guide id="1" orient="horz" pos="2880">
           <p15:clr>
             <a:srgbClr val="A4A3A4"/>
@@ -2203,7 +2203,7 @@
           <p:cNvPr id="2" name="제목 1">
             <a:extLst>
               <a:ext uri="{FF2B5EF4-FFF2-40B4-BE49-F238E27FC236}">
-                <a16:creationId xmlns:a16="http://schemas.microsoft.com/office/drawing/2014/main" xmlns="" id="{BC4B5A23-C81F-4AF5-A748-1D1EE93505F9}"/>
+                <a16:creationId xmlns="" xmlns:a16="http://schemas.microsoft.com/office/drawing/2014/main" id="{BC4B5A23-C81F-4AF5-A748-1D1EE93505F9}"/>
               </a:ext>
             </a:extLst>
           </p:cNvPr>
@@ -2240,7 +2240,7 @@
           <p:cNvPr id="3" name="부제목 2">
             <a:extLst>
               <a:ext uri="{FF2B5EF4-FFF2-40B4-BE49-F238E27FC236}">
-                <a16:creationId xmlns:a16="http://schemas.microsoft.com/office/drawing/2014/main" xmlns="" id="{26F8B85E-9692-4475-9B5C-3E3DB5D88828}"/>
+                <a16:creationId xmlns="" xmlns:a16="http://schemas.microsoft.com/office/drawing/2014/main" id="{26F8B85E-9692-4475-9B5C-3E3DB5D88828}"/>
               </a:ext>
             </a:extLst>
           </p:cNvPr>
@@ -2310,7 +2310,7 @@
           <p:cNvPr id="4" name="날짜 개체 틀 3">
             <a:extLst>
               <a:ext uri="{FF2B5EF4-FFF2-40B4-BE49-F238E27FC236}">
-                <a16:creationId xmlns:a16="http://schemas.microsoft.com/office/drawing/2014/main" xmlns="" id="{BC005B73-604A-4AB5-8137-DDC71FB7678B}"/>
+                <a16:creationId xmlns="" xmlns:a16="http://schemas.microsoft.com/office/drawing/2014/main" id="{BC005B73-604A-4AB5-8137-DDC71FB7678B}"/>
               </a:ext>
             </a:extLst>
           </p:cNvPr>
@@ -2360,7 +2360,7 @@
           <p:cNvPr id="5" name="바닥글 개체 틀 4">
             <a:extLst>
               <a:ext uri="{FF2B5EF4-FFF2-40B4-BE49-F238E27FC236}">
-                <a16:creationId xmlns:a16="http://schemas.microsoft.com/office/drawing/2014/main" xmlns="" id="{D657B5ED-EDEA-4726-A63A-ABCD88DDA24F}"/>
+                <a16:creationId xmlns="" xmlns:a16="http://schemas.microsoft.com/office/drawing/2014/main" id="{D657B5ED-EDEA-4726-A63A-ABCD88DDA24F}"/>
               </a:ext>
             </a:extLst>
           </p:cNvPr>
@@ -2399,7 +2399,7 @@
           <p:cNvPr id="6" name="슬라이드 번호 개체 틀 5">
             <a:extLst>
               <a:ext uri="{FF2B5EF4-FFF2-40B4-BE49-F238E27FC236}">
-                <a16:creationId xmlns:a16="http://schemas.microsoft.com/office/drawing/2014/main" xmlns="" id="{EE561B83-F1A6-46DA-BD34-3B375CB3487C}"/>
+                <a16:creationId xmlns="" xmlns:a16="http://schemas.microsoft.com/office/drawing/2014/main" id="{EE561B83-F1A6-46DA-BD34-3B375CB3487C}"/>
               </a:ext>
             </a:extLst>
           </p:cNvPr>
@@ -4031,7 +4031,7 @@
           <p:cNvPr id="28" name="그룹 27">
             <a:extLst>
               <a:ext uri="{FF2B5EF4-FFF2-40B4-BE49-F238E27FC236}">
-                <a16:creationId xmlns:a16="http://schemas.microsoft.com/office/drawing/2014/main" xmlns="" id="{93ED6B66-45E2-4F28-BD4E-9A683E3FCF6D}"/>
+                <a16:creationId xmlns="" xmlns:a16="http://schemas.microsoft.com/office/drawing/2014/main" id="{93ED6B66-45E2-4F28-BD4E-9A683E3FCF6D}"/>
               </a:ext>
             </a:extLst>
           </p:cNvPr>
@@ -4058,7 +4058,7 @@
             <p:cNvPr id="29" name="Freeform 37">
               <a:extLst>
                 <a:ext uri="{FF2B5EF4-FFF2-40B4-BE49-F238E27FC236}">
-                  <a16:creationId xmlns:a16="http://schemas.microsoft.com/office/drawing/2014/main" xmlns="" id="{ADEA0806-DE38-475A-BD55-F8D173EB52A5}"/>
+                  <a16:creationId xmlns="" xmlns:a16="http://schemas.microsoft.com/office/drawing/2014/main" id="{ADEA0806-DE38-475A-BD55-F8D173EB52A5}"/>
                 </a:ext>
               </a:extLst>
             </p:cNvPr>
@@ -4643,7 +4643,7 @@
             <p:cNvPr id="30" name="Freeform 38">
               <a:extLst>
                 <a:ext uri="{FF2B5EF4-FFF2-40B4-BE49-F238E27FC236}">
-                  <a16:creationId xmlns:a16="http://schemas.microsoft.com/office/drawing/2014/main" xmlns="" id="{D13F76C6-5E5B-4424-A081-09B1E62D8939}"/>
+                  <a16:creationId xmlns="" xmlns:a16="http://schemas.microsoft.com/office/drawing/2014/main" id="{D13F76C6-5E5B-4424-A081-09B1E62D8939}"/>
                 </a:ext>
               </a:extLst>
             </p:cNvPr>
@@ -5197,7 +5197,7 @@
             <p:cNvPr id="31" name="Freeform 39">
               <a:extLst>
                 <a:ext uri="{FF2B5EF4-FFF2-40B4-BE49-F238E27FC236}">
-                  <a16:creationId xmlns:a16="http://schemas.microsoft.com/office/drawing/2014/main" xmlns="" id="{8AA3F8FD-3833-44C4-84F6-6C15FA66A33B}"/>
+                  <a16:creationId xmlns="" xmlns:a16="http://schemas.microsoft.com/office/drawing/2014/main" id="{8AA3F8FD-3833-44C4-84F6-6C15FA66A33B}"/>
                 </a:ext>
               </a:extLst>
             </p:cNvPr>
@@ -5685,7 +5685,7 @@
             <p:cNvPr id="32" name="Freeform 40">
               <a:extLst>
                 <a:ext uri="{FF2B5EF4-FFF2-40B4-BE49-F238E27FC236}">
-                  <a16:creationId xmlns:a16="http://schemas.microsoft.com/office/drawing/2014/main" xmlns="" id="{82A8B903-85D9-4AC8-B553-A53FF1528DD6}"/>
+                  <a16:creationId xmlns="" xmlns:a16="http://schemas.microsoft.com/office/drawing/2014/main" id="{82A8B903-85D9-4AC8-B553-A53FF1528DD6}"/>
                 </a:ext>
               </a:extLst>
             </p:cNvPr>
@@ -5997,7 +5997,7 @@
             <p:cNvPr id="33" name="Freeform 41">
               <a:extLst>
                 <a:ext uri="{FF2B5EF4-FFF2-40B4-BE49-F238E27FC236}">
-                  <a16:creationId xmlns:a16="http://schemas.microsoft.com/office/drawing/2014/main" xmlns="" id="{23150D66-8A0D-4D47-BDFD-CEC8C82F95CB}"/>
+                  <a16:creationId xmlns="" xmlns:a16="http://schemas.microsoft.com/office/drawing/2014/main" id="{23150D66-8A0D-4D47-BDFD-CEC8C82F95CB}"/>
                 </a:ext>
               </a:extLst>
             </p:cNvPr>
@@ -6606,7 +6606,7 @@
             <p:cNvPr id="34" name="Freeform 51">
               <a:extLst>
                 <a:ext uri="{FF2B5EF4-FFF2-40B4-BE49-F238E27FC236}">
-                  <a16:creationId xmlns:a16="http://schemas.microsoft.com/office/drawing/2014/main" xmlns="" id="{D1395DDB-4798-4901-96C1-6E8A0C25E5BB}"/>
+                  <a16:creationId xmlns="" xmlns:a16="http://schemas.microsoft.com/office/drawing/2014/main" id="{D1395DDB-4798-4901-96C1-6E8A0C25E5BB}"/>
                 </a:ext>
               </a:extLst>
             </p:cNvPr>
@@ -7102,7 +7102,7 @@
             <p:cNvPr id="35" name="Freeform 52">
               <a:extLst>
                 <a:ext uri="{FF2B5EF4-FFF2-40B4-BE49-F238E27FC236}">
-                  <a16:creationId xmlns:a16="http://schemas.microsoft.com/office/drawing/2014/main" xmlns="" id="{3FFE6A3B-C3E4-4B4C-A5AF-30A6ED7A63F0}"/>
+                  <a16:creationId xmlns="" xmlns:a16="http://schemas.microsoft.com/office/drawing/2014/main" id="{3FFE6A3B-C3E4-4B4C-A5AF-30A6ED7A63F0}"/>
                 </a:ext>
               </a:extLst>
             </p:cNvPr>
@@ -7210,7 +7210,7 @@
             <p:cNvPr id="36" name="Freeform 53">
               <a:extLst>
                 <a:ext uri="{FF2B5EF4-FFF2-40B4-BE49-F238E27FC236}">
-                  <a16:creationId xmlns:a16="http://schemas.microsoft.com/office/drawing/2014/main" xmlns="" id="{02E90574-0A63-4622-B924-3593D481085C}"/>
+                  <a16:creationId xmlns="" xmlns:a16="http://schemas.microsoft.com/office/drawing/2014/main" id="{02E90574-0A63-4622-B924-3593D481085C}"/>
                 </a:ext>
               </a:extLst>
             </p:cNvPr>
@@ -7267,7 +7267,7 @@
             <p:cNvPr id="37" name="Freeform 54">
               <a:extLst>
                 <a:ext uri="{FF2B5EF4-FFF2-40B4-BE49-F238E27FC236}">
-                  <a16:creationId xmlns:a16="http://schemas.microsoft.com/office/drawing/2014/main" xmlns="" id="{EF4B07AC-CF9B-451A-A3AF-0F38C9A9E8FD}"/>
+                  <a16:creationId xmlns="" xmlns:a16="http://schemas.microsoft.com/office/drawing/2014/main" id="{EF4B07AC-CF9B-451A-A3AF-0F38C9A9E8FD}"/>
                 </a:ext>
               </a:extLst>
             </p:cNvPr>
@@ -7635,7 +7635,7 @@
           <p:cNvPr id="11" name="Freeform 6">
             <a:extLst>
               <a:ext uri="{FF2B5EF4-FFF2-40B4-BE49-F238E27FC236}">
-                <a16:creationId xmlns:a16="http://schemas.microsoft.com/office/drawing/2014/main" xmlns="" id="{35433E1F-1BF4-44C0-B509-EB1742FF1405}"/>
+                <a16:creationId xmlns="" xmlns:a16="http://schemas.microsoft.com/office/drawing/2014/main" id="{35433E1F-1BF4-44C0-B509-EB1742FF1405}"/>
               </a:ext>
             </a:extLst>
           </p:cNvPr>
@@ -8034,7 +8034,7 @@
           <p:cNvPr id="13" name="Freeform 8">
             <a:extLst>
               <a:ext uri="{FF2B5EF4-FFF2-40B4-BE49-F238E27FC236}">
-                <a16:creationId xmlns:a16="http://schemas.microsoft.com/office/drawing/2014/main" xmlns="" id="{19190BD7-A4C5-49EB-A60F-06D7B1F74A20}"/>
+                <a16:creationId xmlns="" xmlns:a16="http://schemas.microsoft.com/office/drawing/2014/main" id="{19190BD7-A4C5-49EB-A60F-06D7B1F74A20}"/>
               </a:ext>
             </a:extLst>
           </p:cNvPr>
@@ -8702,7 +8702,7 @@
           <p:cNvPr id="18" name="사각형: 둥근 위쪽 모서리 17">
             <a:extLst>
               <a:ext uri="{FF2B5EF4-FFF2-40B4-BE49-F238E27FC236}">
-                <a16:creationId xmlns:a16="http://schemas.microsoft.com/office/drawing/2014/main" xmlns="" id="{BDEA6046-5656-4E1F-B418-5AD4F1F65CD1}"/>
+                <a16:creationId xmlns="" xmlns:a16="http://schemas.microsoft.com/office/drawing/2014/main" id="{BDEA6046-5656-4E1F-B418-5AD4F1F65CD1}"/>
               </a:ext>
             </a:extLst>
           </p:cNvPr>
@@ -8763,7 +8763,7 @@
           <p:cNvPr id="12" name="사각형: 둥근 위쪽 모서리 11">
             <a:extLst>
               <a:ext uri="{FF2B5EF4-FFF2-40B4-BE49-F238E27FC236}">
-                <a16:creationId xmlns:a16="http://schemas.microsoft.com/office/drawing/2014/main" xmlns="" id="{75627340-CA4C-4FDF-AC15-1D3AE4A4C536}"/>
+                <a16:creationId xmlns="" xmlns:a16="http://schemas.microsoft.com/office/drawing/2014/main" id="{75627340-CA4C-4FDF-AC15-1D3AE4A4C536}"/>
               </a:ext>
             </a:extLst>
           </p:cNvPr>
@@ -8824,7 +8824,7 @@
           <p:cNvPr id="14" name="사각형: 둥근 위쪽 모서리 13">
             <a:extLst>
               <a:ext uri="{FF2B5EF4-FFF2-40B4-BE49-F238E27FC236}">
-                <a16:creationId xmlns:a16="http://schemas.microsoft.com/office/drawing/2014/main" xmlns="" id="{FBB8B854-0C91-4123-8602-729BD5DB54ED}"/>
+                <a16:creationId xmlns="" xmlns:a16="http://schemas.microsoft.com/office/drawing/2014/main" id="{FBB8B854-0C91-4123-8602-729BD5DB54ED}"/>
               </a:ext>
             </a:extLst>
           </p:cNvPr>
@@ -8885,7 +8885,7 @@
           <p:cNvPr id="15" name="사각형: 둥근 위쪽 모서리 14">
             <a:extLst>
               <a:ext uri="{FF2B5EF4-FFF2-40B4-BE49-F238E27FC236}">
-                <a16:creationId xmlns:a16="http://schemas.microsoft.com/office/drawing/2014/main" xmlns="" id="{167316CA-8CC3-403B-8C11-60B19A432E91}"/>
+                <a16:creationId xmlns="" xmlns:a16="http://schemas.microsoft.com/office/drawing/2014/main" id="{167316CA-8CC3-403B-8C11-60B19A432E91}"/>
               </a:ext>
             </a:extLst>
           </p:cNvPr>
@@ -8946,7 +8946,7 @@
           <p:cNvPr id="6" name="자유형: 도형 5">
             <a:extLst>
               <a:ext uri="{FF2B5EF4-FFF2-40B4-BE49-F238E27FC236}">
-                <a16:creationId xmlns:a16="http://schemas.microsoft.com/office/drawing/2014/main" xmlns="" id="{01D0019B-4C1B-4151-B5F9-B30DF72D2F9C}"/>
+                <a16:creationId xmlns="" xmlns:a16="http://schemas.microsoft.com/office/drawing/2014/main" id="{01D0019B-4C1B-4151-B5F9-B30DF72D2F9C}"/>
               </a:ext>
             </a:extLst>
           </p:cNvPr>
@@ -9100,7 +9100,7 @@
           <p:cNvPr id="27" name="직사각형 26">
             <a:extLst>
               <a:ext uri="{FF2B5EF4-FFF2-40B4-BE49-F238E27FC236}">
-                <a16:creationId xmlns:a16="http://schemas.microsoft.com/office/drawing/2014/main" xmlns="" id="{C7A07ABD-FE64-47B7-8F0D-7531598644C5}"/>
+                <a16:creationId xmlns="" xmlns:a16="http://schemas.microsoft.com/office/drawing/2014/main" id="{C7A07ABD-FE64-47B7-8F0D-7531598644C5}"/>
               </a:ext>
             </a:extLst>
           </p:cNvPr>
@@ -9179,7 +9179,7 @@
           <p:cNvPr id="9" name="직선 연결선 8">
             <a:extLst>
               <a:ext uri="{FF2B5EF4-FFF2-40B4-BE49-F238E27FC236}">
-                <a16:creationId xmlns:a16="http://schemas.microsoft.com/office/drawing/2014/main" xmlns="" id="{ADD6F06E-82C7-4691-81A5-6FCAAE8DF971}"/>
+                <a16:creationId xmlns="" xmlns:a16="http://schemas.microsoft.com/office/drawing/2014/main" id="{ADD6F06E-82C7-4691-81A5-6FCAAE8DF971}"/>
               </a:ext>
             </a:extLst>
           </p:cNvPr>
@@ -9223,7 +9223,7 @@
           <p:cNvPr id="38" name="그룹 37">
             <a:extLst>
               <a:ext uri="{FF2B5EF4-FFF2-40B4-BE49-F238E27FC236}">
-                <a16:creationId xmlns:a16="http://schemas.microsoft.com/office/drawing/2014/main" xmlns="" id="{2C2E7834-32AF-460A-AC90-7CBE17CCC694}"/>
+                <a16:creationId xmlns="" xmlns:a16="http://schemas.microsoft.com/office/drawing/2014/main" id="{2C2E7834-32AF-460A-AC90-7CBE17CCC694}"/>
               </a:ext>
             </a:extLst>
           </p:cNvPr>
@@ -9243,7 +9243,7 @@
             <p:cNvPr id="39" name="자유형 65">
               <a:extLst>
                 <a:ext uri="{FF2B5EF4-FFF2-40B4-BE49-F238E27FC236}">
-                  <a16:creationId xmlns:a16="http://schemas.microsoft.com/office/drawing/2014/main" xmlns="" id="{3C6B5641-9309-4B54-BE3F-E1640860354C}"/>
+                  <a16:creationId xmlns="" xmlns:a16="http://schemas.microsoft.com/office/drawing/2014/main" id="{3C6B5641-9309-4B54-BE3F-E1640860354C}"/>
                 </a:ext>
               </a:extLst>
             </p:cNvPr>
@@ -9484,7 +9484,7 @@
             <p:cNvPr id="40" name="자유형 66">
               <a:extLst>
                 <a:ext uri="{FF2B5EF4-FFF2-40B4-BE49-F238E27FC236}">
-                  <a16:creationId xmlns:a16="http://schemas.microsoft.com/office/drawing/2014/main" xmlns="" id="{C39EC402-9800-4866-9F84-6E9C068471CD}"/>
+                  <a16:creationId xmlns="" xmlns:a16="http://schemas.microsoft.com/office/drawing/2014/main" id="{C39EC402-9800-4866-9F84-6E9C068471CD}"/>
                 </a:ext>
               </a:extLst>
             </p:cNvPr>
@@ -9662,7 +9662,7 @@
           <p:cNvPr id="44" name="Freeform 8">
             <a:extLst>
               <a:ext uri="{FF2B5EF4-FFF2-40B4-BE49-F238E27FC236}">
-                <a16:creationId xmlns:a16="http://schemas.microsoft.com/office/drawing/2014/main" xmlns="" id="{D86CAE7F-6907-4E6F-B42C-12470D4C17BF}"/>
+                <a16:creationId xmlns="" xmlns:a16="http://schemas.microsoft.com/office/drawing/2014/main" id="{D86CAE7F-6907-4E6F-B42C-12470D4C17BF}"/>
               </a:ext>
             </a:extLst>
           </p:cNvPr>
@@ -11963,21 +11963,21 @@
                 <a:gridCol w="2936450">
                   <a:extLst>
                     <a:ext uri="{9D8B030D-6E8A-4147-A177-3AD203B41FA5}">
-                      <a16:colId xmlns:a16="http://schemas.microsoft.com/office/drawing/2014/main" xmlns="" val="20001"/>
+                      <a16:colId xmlns="" xmlns:a16="http://schemas.microsoft.com/office/drawing/2014/main" val="20001"/>
                     </a:ext>
                   </a:extLst>
                 </a:gridCol>
                 <a:gridCol w="1728192">
                   <a:extLst>
                     <a:ext uri="{9D8B030D-6E8A-4147-A177-3AD203B41FA5}">
-                      <a16:colId xmlns:a16="http://schemas.microsoft.com/office/drawing/2014/main" xmlns="" val="20002"/>
+                      <a16:colId xmlns="" xmlns:a16="http://schemas.microsoft.com/office/drawing/2014/main" val="20002"/>
                     </a:ext>
                   </a:extLst>
                 </a:gridCol>
                 <a:gridCol w="1099878">
                   <a:extLst>
                     <a:ext uri="{9D8B030D-6E8A-4147-A177-3AD203B41FA5}">
-                      <a16:colId xmlns:a16="http://schemas.microsoft.com/office/drawing/2014/main" xmlns="" val="20003"/>
+                      <a16:colId xmlns="" xmlns:a16="http://schemas.microsoft.com/office/drawing/2014/main" val="20003"/>
                     </a:ext>
                   </a:extLst>
                 </a:gridCol>
@@ -12117,7 +12117,7 @@
                 </a:tc>
                 <a:extLst>
                   <a:ext uri="{0D108BD9-81ED-4DB2-BD59-A6C34878D82A}">
-                    <a16:rowId xmlns:a16="http://schemas.microsoft.com/office/drawing/2014/main" xmlns="" val="10000"/>
+                    <a16:rowId xmlns="" xmlns:a16="http://schemas.microsoft.com/office/drawing/2014/main" val="10000"/>
                   </a:ext>
                 </a:extLst>
               </a:tr>
@@ -12217,7 +12217,7 @@
                 </a:tc>
                 <a:extLst>
                   <a:ext uri="{0D108BD9-81ED-4DB2-BD59-A6C34878D82A}">
-                    <a16:rowId xmlns:a16="http://schemas.microsoft.com/office/drawing/2014/main" xmlns="" val="10001"/>
+                    <a16:rowId xmlns="" xmlns:a16="http://schemas.microsoft.com/office/drawing/2014/main" val="10001"/>
                   </a:ext>
                 </a:extLst>
               </a:tr>
@@ -12299,7 +12299,7 @@
                 </a:tc>
                 <a:extLst>
                   <a:ext uri="{0D108BD9-81ED-4DB2-BD59-A6C34878D82A}">
-                    <a16:rowId xmlns:a16="http://schemas.microsoft.com/office/drawing/2014/main" xmlns="" val="10002"/>
+                    <a16:rowId xmlns="" xmlns:a16="http://schemas.microsoft.com/office/drawing/2014/main" val="10002"/>
                   </a:ext>
                 </a:extLst>
               </a:tr>
@@ -12393,7 +12393,7 @@
                 </a:tc>
                 <a:extLst>
                   <a:ext uri="{0D108BD9-81ED-4DB2-BD59-A6C34878D82A}">
-                    <a16:rowId xmlns:a16="http://schemas.microsoft.com/office/drawing/2014/main" xmlns="" val="10003"/>
+                    <a16:rowId xmlns="" xmlns:a16="http://schemas.microsoft.com/office/drawing/2014/main" val="10003"/>
                   </a:ext>
                 </a:extLst>
               </a:tr>
@@ -12487,7 +12487,7 @@
                 </a:tc>
                 <a:extLst>
                   <a:ext uri="{0D108BD9-81ED-4DB2-BD59-A6C34878D82A}">
-                    <a16:rowId xmlns:a16="http://schemas.microsoft.com/office/drawing/2014/main" xmlns="" val="10004"/>
+                    <a16:rowId xmlns="" xmlns:a16="http://schemas.microsoft.com/office/drawing/2014/main" val="10004"/>
                   </a:ext>
                 </a:extLst>
               </a:tr>
@@ -12592,7 +12592,7 @@
                 </a:tc>
                 <a:extLst>
                   <a:ext uri="{0D108BD9-81ED-4DB2-BD59-A6C34878D82A}">
-                    <a16:rowId xmlns:a16="http://schemas.microsoft.com/office/drawing/2014/main" xmlns="" val="10005"/>
+                    <a16:rowId xmlns="" xmlns:a16="http://schemas.microsoft.com/office/drawing/2014/main" val="10005"/>
                   </a:ext>
                 </a:extLst>
               </a:tr>
@@ -12686,7 +12686,7 @@
                 </a:tc>
                 <a:extLst>
                   <a:ext uri="{0D108BD9-81ED-4DB2-BD59-A6C34878D82A}">
-                    <a16:rowId xmlns:a16="http://schemas.microsoft.com/office/drawing/2014/main" xmlns="" val="10006"/>
+                    <a16:rowId xmlns="" xmlns:a16="http://schemas.microsoft.com/office/drawing/2014/main" val="10006"/>
                   </a:ext>
                 </a:extLst>
               </a:tr>
@@ -12777,7 +12777,7 @@
                 </a:tc>
                 <a:extLst>
                   <a:ext uri="{0D108BD9-81ED-4DB2-BD59-A6C34878D82A}">
-                    <a16:rowId xmlns:a16="http://schemas.microsoft.com/office/drawing/2014/main" xmlns="" val="10007"/>
+                    <a16:rowId xmlns="" xmlns:a16="http://schemas.microsoft.com/office/drawing/2014/main" val="10007"/>
                   </a:ext>
                 </a:extLst>
               </a:tr>
@@ -12883,7 +12883,7 @@
                 </a:tc>
                 <a:extLst>
                   <a:ext uri="{0D108BD9-81ED-4DB2-BD59-A6C34878D82A}">
-                    <a16:rowId xmlns:a16="http://schemas.microsoft.com/office/drawing/2014/main" xmlns="" val="10008"/>
+                    <a16:rowId xmlns="" xmlns:a16="http://schemas.microsoft.com/office/drawing/2014/main" val="10008"/>
                   </a:ext>
                 </a:extLst>
               </a:tr>
@@ -12965,7 +12965,7 @@
                 </a:tc>
                 <a:extLst>
                   <a:ext uri="{0D108BD9-81ED-4DB2-BD59-A6C34878D82A}">
-                    <a16:rowId xmlns:a16="http://schemas.microsoft.com/office/drawing/2014/main" xmlns="" val="1324333913"/>
+                    <a16:rowId xmlns="" xmlns:a16="http://schemas.microsoft.com/office/drawing/2014/main" val="1324333913"/>
                   </a:ext>
                 </a:extLst>
               </a:tr>
@@ -13059,7 +13059,7 @@
                 </a:tc>
                 <a:extLst>
                   <a:ext uri="{0D108BD9-81ED-4DB2-BD59-A6C34878D82A}">
-                    <a16:rowId xmlns:a16="http://schemas.microsoft.com/office/drawing/2014/main" xmlns="" val="1727322289"/>
+                    <a16:rowId xmlns="" xmlns:a16="http://schemas.microsoft.com/office/drawing/2014/main" val="1727322289"/>
                   </a:ext>
                 </a:extLst>
               </a:tr>
@@ -13153,7 +13153,7 @@
                 </a:tc>
                 <a:extLst>
                   <a:ext uri="{0D108BD9-81ED-4DB2-BD59-A6C34878D82A}">
-                    <a16:rowId xmlns:a16="http://schemas.microsoft.com/office/drawing/2014/main" xmlns="" val="1732334936"/>
+                    <a16:rowId xmlns="" xmlns:a16="http://schemas.microsoft.com/office/drawing/2014/main" val="1732334936"/>
                   </a:ext>
                 </a:extLst>
               </a:tr>
@@ -13258,7 +13258,7 @@
                 </a:tc>
                 <a:extLst>
                   <a:ext uri="{0D108BD9-81ED-4DB2-BD59-A6C34878D82A}">
-                    <a16:rowId xmlns:a16="http://schemas.microsoft.com/office/drawing/2014/main" xmlns="" val="3887831580"/>
+                    <a16:rowId xmlns="" xmlns:a16="http://schemas.microsoft.com/office/drawing/2014/main" val="3887831580"/>
                   </a:ext>
                 </a:extLst>
               </a:tr>
@@ -13352,7 +13352,7 @@
                 </a:tc>
                 <a:extLst>
                   <a:ext uri="{0D108BD9-81ED-4DB2-BD59-A6C34878D82A}">
-                    <a16:rowId xmlns:a16="http://schemas.microsoft.com/office/drawing/2014/main" xmlns="" val="2397129623"/>
+                    <a16:rowId xmlns="" xmlns:a16="http://schemas.microsoft.com/office/drawing/2014/main" val="2397129623"/>
                   </a:ext>
                 </a:extLst>
               </a:tr>
@@ -13503,28 +13503,28 @@
                 <a:gridCol w="1366753">
                   <a:extLst>
                     <a:ext uri="{9D8B030D-6E8A-4147-A177-3AD203B41FA5}">
-                      <a16:colId xmlns:a16="http://schemas.microsoft.com/office/drawing/2014/main" xmlns="" val="20001"/>
+                      <a16:colId xmlns="" xmlns:a16="http://schemas.microsoft.com/office/drawing/2014/main" val="20001"/>
                     </a:ext>
                   </a:extLst>
                 </a:gridCol>
                 <a:gridCol w="1617981">
                   <a:extLst>
                     <a:ext uri="{9D8B030D-6E8A-4147-A177-3AD203B41FA5}">
-                      <a16:colId xmlns:a16="http://schemas.microsoft.com/office/drawing/2014/main" xmlns="" val="20002"/>
+                      <a16:colId xmlns="" xmlns:a16="http://schemas.microsoft.com/office/drawing/2014/main" val="20002"/>
                     </a:ext>
                   </a:extLst>
                 </a:gridCol>
                 <a:gridCol w="4896544">
                   <a:extLst>
                     <a:ext uri="{9D8B030D-6E8A-4147-A177-3AD203B41FA5}">
-                      <a16:colId xmlns:a16="http://schemas.microsoft.com/office/drawing/2014/main" xmlns="" val="20003"/>
+                      <a16:colId xmlns="" xmlns:a16="http://schemas.microsoft.com/office/drawing/2014/main" val="20003"/>
                     </a:ext>
                   </a:extLst>
                 </a:gridCol>
                 <a:gridCol w="833235">
                   <a:extLst>
                     <a:ext uri="{9D8B030D-6E8A-4147-A177-3AD203B41FA5}">
-                      <a16:colId xmlns:a16="http://schemas.microsoft.com/office/drawing/2014/main" xmlns="" val="20004"/>
+                      <a16:colId xmlns="" xmlns:a16="http://schemas.microsoft.com/office/drawing/2014/main" val="20004"/>
                     </a:ext>
                   </a:extLst>
                 </a:gridCol>
@@ -13697,7 +13697,7 @@
                 </a:tc>
                 <a:extLst>
                   <a:ext uri="{0D108BD9-81ED-4DB2-BD59-A6C34878D82A}">
-                    <a16:rowId xmlns:a16="http://schemas.microsoft.com/office/drawing/2014/main" xmlns="" val="10000"/>
+                    <a16:rowId xmlns="" xmlns:a16="http://schemas.microsoft.com/office/drawing/2014/main" val="10000"/>
                   </a:ext>
                 </a:extLst>
               </a:tr>
@@ -13880,7 +13880,7 @@
                 </a:tc>
                 <a:extLst>
                   <a:ext uri="{0D108BD9-81ED-4DB2-BD59-A6C34878D82A}">
-                    <a16:rowId xmlns:a16="http://schemas.microsoft.com/office/drawing/2014/main" xmlns="" val="10001"/>
+                    <a16:rowId xmlns="" xmlns:a16="http://schemas.microsoft.com/office/drawing/2014/main" val="10001"/>
                   </a:ext>
                 </a:extLst>
               </a:tr>
@@ -14160,7 +14160,7 @@
                 </a:tc>
                 <a:extLst>
                   <a:ext uri="{0D108BD9-81ED-4DB2-BD59-A6C34878D82A}">
-                    <a16:rowId xmlns:a16="http://schemas.microsoft.com/office/drawing/2014/main" xmlns="" val="10002"/>
+                    <a16:rowId xmlns="" xmlns:a16="http://schemas.microsoft.com/office/drawing/2014/main" val="10002"/>
                   </a:ext>
                 </a:extLst>
               </a:tr>
@@ -14303,7 +14303,7 @@
                 </a:tc>
                 <a:extLst>
                   <a:ext uri="{0D108BD9-81ED-4DB2-BD59-A6C34878D82A}">
-                    <a16:rowId xmlns:a16="http://schemas.microsoft.com/office/drawing/2014/main" xmlns="" val="10003"/>
+                    <a16:rowId xmlns="" xmlns:a16="http://schemas.microsoft.com/office/drawing/2014/main" val="10003"/>
                   </a:ext>
                 </a:extLst>
               </a:tr>
@@ -14440,7 +14440,7 @@
                 </a:tc>
                 <a:extLst>
                   <a:ext uri="{0D108BD9-81ED-4DB2-BD59-A6C34878D82A}">
-                    <a16:rowId xmlns:a16="http://schemas.microsoft.com/office/drawing/2014/main" xmlns="" val="10004"/>
+                    <a16:rowId xmlns="" xmlns:a16="http://schemas.microsoft.com/office/drawing/2014/main" val="10004"/>
                   </a:ext>
                 </a:extLst>
               </a:tr>
@@ -14648,7 +14648,7 @@
                 </a:tc>
                 <a:extLst>
                   <a:ext uri="{0D108BD9-81ED-4DB2-BD59-A6C34878D82A}">
-                    <a16:rowId xmlns:a16="http://schemas.microsoft.com/office/drawing/2014/main" xmlns="" val="10005"/>
+                    <a16:rowId xmlns="" xmlns:a16="http://schemas.microsoft.com/office/drawing/2014/main" val="10005"/>
                   </a:ext>
                 </a:extLst>
               </a:tr>
@@ -14801,7 +14801,7 @@
                 </a:tc>
                 <a:extLst>
                   <a:ext uri="{0D108BD9-81ED-4DB2-BD59-A6C34878D82A}">
-                    <a16:rowId xmlns:a16="http://schemas.microsoft.com/office/drawing/2014/main" xmlns="" val="10006"/>
+                    <a16:rowId xmlns="" xmlns:a16="http://schemas.microsoft.com/office/drawing/2014/main" val="10006"/>
                   </a:ext>
                 </a:extLst>
               </a:tr>
@@ -14936,7 +14936,7 @@
                 </a:tc>
                 <a:extLst>
                   <a:ext uri="{0D108BD9-81ED-4DB2-BD59-A6C34878D82A}">
-                    <a16:rowId xmlns:a16="http://schemas.microsoft.com/office/drawing/2014/main" xmlns="" val="10007"/>
+                    <a16:rowId xmlns="" xmlns:a16="http://schemas.microsoft.com/office/drawing/2014/main" val="10007"/>
                   </a:ext>
                 </a:extLst>
               </a:tr>
@@ -15153,7 +15153,7 @@
                 </a:tc>
                 <a:extLst>
                   <a:ext uri="{0D108BD9-81ED-4DB2-BD59-A6C34878D82A}">
-                    <a16:rowId xmlns:a16="http://schemas.microsoft.com/office/drawing/2014/main" xmlns="" val="10008"/>
+                    <a16:rowId xmlns="" xmlns:a16="http://schemas.microsoft.com/office/drawing/2014/main" val="10008"/>
                   </a:ext>
                 </a:extLst>
               </a:tr>
@@ -15342,28 +15342,28 @@
                 <a:gridCol w="1223962">
                   <a:extLst>
                     <a:ext uri="{9D8B030D-6E8A-4147-A177-3AD203B41FA5}">
-                      <a16:colId xmlns:a16="http://schemas.microsoft.com/office/drawing/2014/main" xmlns="" val="20001"/>
+                      <a16:colId xmlns="" xmlns:a16="http://schemas.microsoft.com/office/drawing/2014/main" val="20001"/>
                     </a:ext>
                   </a:extLst>
                 </a:gridCol>
                 <a:gridCol w="1690533">
                   <a:extLst>
                     <a:ext uri="{9D8B030D-6E8A-4147-A177-3AD203B41FA5}">
-                      <a16:colId xmlns:a16="http://schemas.microsoft.com/office/drawing/2014/main" xmlns="" val="20002"/>
+                      <a16:colId xmlns="" xmlns:a16="http://schemas.microsoft.com/office/drawing/2014/main" val="20002"/>
                     </a:ext>
                   </a:extLst>
                 </a:gridCol>
                 <a:gridCol w="4934378">
                   <a:extLst>
                     <a:ext uri="{9D8B030D-6E8A-4147-A177-3AD203B41FA5}">
-                      <a16:colId xmlns:a16="http://schemas.microsoft.com/office/drawing/2014/main" xmlns="" val="20003"/>
+                      <a16:colId xmlns="" xmlns:a16="http://schemas.microsoft.com/office/drawing/2014/main" val="20003"/>
                     </a:ext>
                   </a:extLst>
                 </a:gridCol>
                 <a:gridCol w="792088">
                   <a:extLst>
                     <a:ext uri="{9D8B030D-6E8A-4147-A177-3AD203B41FA5}">
-                      <a16:colId xmlns:a16="http://schemas.microsoft.com/office/drawing/2014/main" xmlns="" val="20004"/>
+                      <a16:colId xmlns="" xmlns:a16="http://schemas.microsoft.com/office/drawing/2014/main" val="20004"/>
                     </a:ext>
                   </a:extLst>
                 </a:gridCol>
@@ -15536,7 +15536,7 @@
                 </a:tc>
                 <a:extLst>
                   <a:ext uri="{0D108BD9-81ED-4DB2-BD59-A6C34878D82A}">
-                    <a16:rowId xmlns:a16="http://schemas.microsoft.com/office/drawing/2014/main" xmlns="" val="10000"/>
+                    <a16:rowId xmlns="" xmlns:a16="http://schemas.microsoft.com/office/drawing/2014/main" val="10000"/>
                   </a:ext>
                 </a:extLst>
               </a:tr>
@@ -15679,7 +15679,7 @@
                 </a:tc>
                 <a:extLst>
                   <a:ext uri="{0D108BD9-81ED-4DB2-BD59-A6C34878D82A}">
-                    <a16:rowId xmlns:a16="http://schemas.microsoft.com/office/drawing/2014/main" xmlns="" val="10001"/>
+                    <a16:rowId xmlns="" xmlns:a16="http://schemas.microsoft.com/office/drawing/2014/main" val="10001"/>
                   </a:ext>
                 </a:extLst>
               </a:tr>
@@ -15766,7 +15766,7 @@
                 </a:tc>
                 <a:extLst>
                   <a:ext uri="{0D108BD9-81ED-4DB2-BD59-A6C34878D82A}">
-                    <a16:rowId xmlns:a16="http://schemas.microsoft.com/office/drawing/2014/main" xmlns="" val="10002"/>
+                    <a16:rowId xmlns="" xmlns:a16="http://schemas.microsoft.com/office/drawing/2014/main" val="10002"/>
                   </a:ext>
                 </a:extLst>
               </a:tr>
@@ -15925,7 +15925,7 @@
                 </a:tc>
                 <a:extLst>
                   <a:ext uri="{0D108BD9-81ED-4DB2-BD59-A6C34878D82A}">
-                    <a16:rowId xmlns:a16="http://schemas.microsoft.com/office/drawing/2014/main" xmlns="" val="10003"/>
+                    <a16:rowId xmlns="" xmlns:a16="http://schemas.microsoft.com/office/drawing/2014/main" val="10003"/>
                   </a:ext>
                 </a:extLst>
               </a:tr>
@@ -16052,7 +16052,7 @@
                 </a:tc>
                 <a:extLst>
                   <a:ext uri="{0D108BD9-81ED-4DB2-BD59-A6C34878D82A}">
-                    <a16:rowId xmlns:a16="http://schemas.microsoft.com/office/drawing/2014/main" xmlns="" val="10004"/>
+                    <a16:rowId xmlns="" xmlns:a16="http://schemas.microsoft.com/office/drawing/2014/main" val="10004"/>
                   </a:ext>
                 </a:extLst>
               </a:tr>
@@ -16163,7 +16163,7 @@
                 </a:tc>
                 <a:extLst>
                   <a:ext uri="{0D108BD9-81ED-4DB2-BD59-A6C34878D82A}">
-                    <a16:rowId xmlns:a16="http://schemas.microsoft.com/office/drawing/2014/main" xmlns="" val="10005"/>
+                    <a16:rowId xmlns="" xmlns:a16="http://schemas.microsoft.com/office/drawing/2014/main" val="10005"/>
                   </a:ext>
                 </a:extLst>
               </a:tr>
@@ -16266,7 +16266,7 @@
                 </a:tc>
                 <a:extLst>
                   <a:ext uri="{0D108BD9-81ED-4DB2-BD59-A6C34878D82A}">
-                    <a16:rowId xmlns:a16="http://schemas.microsoft.com/office/drawing/2014/main" xmlns="" val="10006"/>
+                    <a16:rowId xmlns="" xmlns:a16="http://schemas.microsoft.com/office/drawing/2014/main" val="10006"/>
                   </a:ext>
                 </a:extLst>
               </a:tr>
@@ -16423,28 +16423,28 @@
                 <a:gridCol w="1296144">
                   <a:extLst>
                     <a:ext uri="{9D8B030D-6E8A-4147-A177-3AD203B41FA5}">
-                      <a16:colId xmlns:a16="http://schemas.microsoft.com/office/drawing/2014/main" xmlns="" val="20001"/>
+                      <a16:colId xmlns="" xmlns:a16="http://schemas.microsoft.com/office/drawing/2014/main" val="20001"/>
                     </a:ext>
                   </a:extLst>
                 </a:gridCol>
                 <a:gridCol w="1546091">
                   <a:extLst>
                     <a:ext uri="{9D8B030D-6E8A-4147-A177-3AD203B41FA5}">
-                      <a16:colId xmlns:a16="http://schemas.microsoft.com/office/drawing/2014/main" xmlns="" val="20002"/>
+                      <a16:colId xmlns="" xmlns:a16="http://schemas.microsoft.com/office/drawing/2014/main" val="20002"/>
                     </a:ext>
                   </a:extLst>
                 </a:gridCol>
                 <a:gridCol w="5006637">
                   <a:extLst>
                     <a:ext uri="{9D8B030D-6E8A-4147-A177-3AD203B41FA5}">
-                      <a16:colId xmlns:a16="http://schemas.microsoft.com/office/drawing/2014/main" xmlns="" val="20003"/>
+                      <a16:colId xmlns="" xmlns:a16="http://schemas.microsoft.com/office/drawing/2014/main" val="20003"/>
                     </a:ext>
                   </a:extLst>
                 </a:gridCol>
                 <a:gridCol w="792088">
                   <a:extLst>
                     <a:ext uri="{9D8B030D-6E8A-4147-A177-3AD203B41FA5}">
-                      <a16:colId xmlns:a16="http://schemas.microsoft.com/office/drawing/2014/main" xmlns="" val="20004"/>
+                      <a16:colId xmlns="" xmlns:a16="http://schemas.microsoft.com/office/drawing/2014/main" val="20004"/>
                     </a:ext>
                   </a:extLst>
                 </a:gridCol>
@@ -16617,7 +16617,7 @@
                 </a:tc>
                 <a:extLst>
                   <a:ext uri="{0D108BD9-81ED-4DB2-BD59-A6C34878D82A}">
-                    <a16:rowId xmlns:a16="http://schemas.microsoft.com/office/drawing/2014/main" xmlns="" val="10000"/>
+                    <a16:rowId xmlns="" xmlns:a16="http://schemas.microsoft.com/office/drawing/2014/main" val="10000"/>
                   </a:ext>
                 </a:extLst>
               </a:tr>
@@ -16752,7 +16752,7 @@
                 </a:tc>
                 <a:extLst>
                   <a:ext uri="{0D108BD9-81ED-4DB2-BD59-A6C34878D82A}">
-                    <a16:rowId xmlns:a16="http://schemas.microsoft.com/office/drawing/2014/main" xmlns="" val="10001"/>
+                    <a16:rowId xmlns="" xmlns:a16="http://schemas.microsoft.com/office/drawing/2014/main" val="10001"/>
                   </a:ext>
                 </a:extLst>
               </a:tr>
@@ -16839,7 +16839,7 @@
                 </a:tc>
                 <a:extLst>
                   <a:ext uri="{0D108BD9-81ED-4DB2-BD59-A6C34878D82A}">
-                    <a16:rowId xmlns:a16="http://schemas.microsoft.com/office/drawing/2014/main" xmlns="" val="10002"/>
+                    <a16:rowId xmlns="" xmlns:a16="http://schemas.microsoft.com/office/drawing/2014/main" val="10002"/>
                   </a:ext>
                 </a:extLst>
               </a:tr>
@@ -16958,7 +16958,7 @@
                 </a:tc>
                 <a:extLst>
                   <a:ext uri="{0D108BD9-81ED-4DB2-BD59-A6C34878D82A}">
-                    <a16:rowId xmlns:a16="http://schemas.microsoft.com/office/drawing/2014/main" xmlns="" val="10003"/>
+                    <a16:rowId xmlns="" xmlns:a16="http://schemas.microsoft.com/office/drawing/2014/main" val="10003"/>
                   </a:ext>
                 </a:extLst>
               </a:tr>
@@ -17077,7 +17077,7 @@
                 </a:tc>
                 <a:extLst>
                   <a:ext uri="{0D108BD9-81ED-4DB2-BD59-A6C34878D82A}">
-                    <a16:rowId xmlns:a16="http://schemas.microsoft.com/office/drawing/2014/main" xmlns="" val="10004"/>
+                    <a16:rowId xmlns="" xmlns:a16="http://schemas.microsoft.com/office/drawing/2014/main" val="10004"/>
                   </a:ext>
                 </a:extLst>
               </a:tr>
@@ -17164,7 +17164,7 @@
                 </a:tc>
                 <a:extLst>
                   <a:ext uri="{0D108BD9-81ED-4DB2-BD59-A6C34878D82A}">
-                    <a16:rowId xmlns:a16="http://schemas.microsoft.com/office/drawing/2014/main" xmlns="" val="10005"/>
+                    <a16:rowId xmlns="" xmlns:a16="http://schemas.microsoft.com/office/drawing/2014/main" val="10005"/>
                   </a:ext>
                 </a:extLst>
               </a:tr>
@@ -17291,7 +17291,7 @@
                 </a:tc>
                 <a:extLst>
                   <a:ext uri="{0D108BD9-81ED-4DB2-BD59-A6C34878D82A}">
-                    <a16:rowId xmlns:a16="http://schemas.microsoft.com/office/drawing/2014/main" xmlns="" val="10006"/>
+                    <a16:rowId xmlns="" xmlns:a16="http://schemas.microsoft.com/office/drawing/2014/main" val="10006"/>
                   </a:ext>
                 </a:extLst>
               </a:tr>
@@ -17448,28 +17448,28 @@
                 <a:gridCol w="1008114">
                   <a:extLst>
                     <a:ext uri="{9D8B030D-6E8A-4147-A177-3AD203B41FA5}">
-                      <a16:colId xmlns:a16="http://schemas.microsoft.com/office/drawing/2014/main" xmlns="" val="20001"/>
+                      <a16:colId xmlns="" xmlns:a16="http://schemas.microsoft.com/office/drawing/2014/main" val="20001"/>
                     </a:ext>
                   </a:extLst>
                 </a:gridCol>
                 <a:gridCol w="1656184">
                   <a:extLst>
                     <a:ext uri="{9D8B030D-6E8A-4147-A177-3AD203B41FA5}">
-                      <a16:colId xmlns:a16="http://schemas.microsoft.com/office/drawing/2014/main" xmlns="" val="20002"/>
+                      <a16:colId xmlns="" xmlns:a16="http://schemas.microsoft.com/office/drawing/2014/main" val="20002"/>
                     </a:ext>
                   </a:extLst>
                 </a:gridCol>
                 <a:gridCol w="5328592">
                   <a:extLst>
                     <a:ext uri="{9D8B030D-6E8A-4147-A177-3AD203B41FA5}">
-                      <a16:colId xmlns:a16="http://schemas.microsoft.com/office/drawing/2014/main" xmlns="" val="20003"/>
+                      <a16:colId xmlns="" xmlns:a16="http://schemas.microsoft.com/office/drawing/2014/main" val="20003"/>
                     </a:ext>
                   </a:extLst>
                 </a:gridCol>
                 <a:gridCol w="648072">
                   <a:extLst>
                     <a:ext uri="{9D8B030D-6E8A-4147-A177-3AD203B41FA5}">
-                      <a16:colId xmlns:a16="http://schemas.microsoft.com/office/drawing/2014/main" xmlns="" val="20004"/>
+                      <a16:colId xmlns="" xmlns:a16="http://schemas.microsoft.com/office/drawing/2014/main" val="20004"/>
                     </a:ext>
                   </a:extLst>
                 </a:gridCol>
@@ -17642,7 +17642,7 @@
                 </a:tc>
                 <a:extLst>
                   <a:ext uri="{0D108BD9-81ED-4DB2-BD59-A6C34878D82A}">
-                    <a16:rowId xmlns:a16="http://schemas.microsoft.com/office/drawing/2014/main" xmlns="" val="10000"/>
+                    <a16:rowId xmlns="" xmlns:a16="http://schemas.microsoft.com/office/drawing/2014/main" val="10000"/>
                   </a:ext>
                 </a:extLst>
               </a:tr>
@@ -17968,7 +17968,7 @@
                 </a:tc>
                 <a:extLst>
                   <a:ext uri="{0D108BD9-81ED-4DB2-BD59-A6C34878D82A}">
-                    <a16:rowId xmlns:a16="http://schemas.microsoft.com/office/drawing/2014/main" xmlns="" val="10001"/>
+                    <a16:rowId xmlns="" xmlns:a16="http://schemas.microsoft.com/office/drawing/2014/main" val="10001"/>
                   </a:ext>
                 </a:extLst>
               </a:tr>
@@ -18141,7 +18141,7 @@
                 </a:tc>
                 <a:extLst>
                   <a:ext uri="{0D108BD9-81ED-4DB2-BD59-A6C34878D82A}">
-                    <a16:rowId xmlns:a16="http://schemas.microsoft.com/office/drawing/2014/main" xmlns="" val="10002"/>
+                    <a16:rowId xmlns="" xmlns:a16="http://schemas.microsoft.com/office/drawing/2014/main" val="10002"/>
                   </a:ext>
                 </a:extLst>
               </a:tr>
@@ -18442,7 +18442,7 @@
                 </a:tc>
                 <a:extLst>
                   <a:ext uri="{0D108BD9-81ED-4DB2-BD59-A6C34878D82A}">
-                    <a16:rowId xmlns:a16="http://schemas.microsoft.com/office/drawing/2014/main" xmlns="" val="10003"/>
+                    <a16:rowId xmlns="" xmlns:a16="http://schemas.microsoft.com/office/drawing/2014/main" val="10003"/>
                   </a:ext>
                 </a:extLst>
               </a:tr>
@@ -18680,7 +18680,7 @@
                 </a:tc>
                 <a:extLst>
                   <a:ext uri="{0D108BD9-81ED-4DB2-BD59-A6C34878D82A}">
-                    <a16:rowId xmlns:a16="http://schemas.microsoft.com/office/drawing/2014/main" xmlns="" val="10004"/>
+                    <a16:rowId xmlns="" xmlns:a16="http://schemas.microsoft.com/office/drawing/2014/main" val="10004"/>
                   </a:ext>
                 </a:extLst>
               </a:tr>
@@ -18863,7 +18863,7 @@
                 </a:tc>
                 <a:extLst>
                   <a:ext uri="{0D108BD9-81ED-4DB2-BD59-A6C34878D82A}">
-                    <a16:rowId xmlns:a16="http://schemas.microsoft.com/office/drawing/2014/main" xmlns="" val="10005"/>
+                    <a16:rowId xmlns="" xmlns:a16="http://schemas.microsoft.com/office/drawing/2014/main" val="10005"/>
                   </a:ext>
                 </a:extLst>
               </a:tr>
@@ -18974,7 +18974,7 @@
                 </a:tc>
                 <a:extLst>
                   <a:ext uri="{0D108BD9-81ED-4DB2-BD59-A6C34878D82A}">
-                    <a16:rowId xmlns:a16="http://schemas.microsoft.com/office/drawing/2014/main" xmlns="" val="10006"/>
+                    <a16:rowId xmlns="" xmlns:a16="http://schemas.microsoft.com/office/drawing/2014/main" val="10006"/>
                   </a:ext>
                 </a:extLst>
               </a:tr>
@@ -19140,7 +19140,7 @@
                 </a:tc>
                 <a:extLst>
                   <a:ext uri="{0D108BD9-81ED-4DB2-BD59-A6C34878D82A}">
-                    <a16:rowId xmlns:a16="http://schemas.microsoft.com/office/drawing/2014/main" xmlns="" val="10007"/>
+                    <a16:rowId xmlns="" xmlns:a16="http://schemas.microsoft.com/office/drawing/2014/main" val="10007"/>
                   </a:ext>
                 </a:extLst>
               </a:tr>
@@ -19280,7 +19280,7 @@
                 </a:tc>
                 <a:extLst>
                   <a:ext uri="{0D108BD9-81ED-4DB2-BD59-A6C34878D82A}">
-                    <a16:rowId xmlns:a16="http://schemas.microsoft.com/office/drawing/2014/main" xmlns="" val="10008"/>
+                    <a16:rowId xmlns="" xmlns:a16="http://schemas.microsoft.com/office/drawing/2014/main" val="10008"/>
                   </a:ext>
                 </a:extLst>
               </a:tr>
@@ -19373,7 +19373,7 @@
                 </a:tc>
                 <a:extLst>
                   <a:ext uri="{0D108BD9-81ED-4DB2-BD59-A6C34878D82A}">
-                    <a16:rowId xmlns:a16="http://schemas.microsoft.com/office/drawing/2014/main" xmlns="" val="10009"/>
+                    <a16:rowId xmlns="" xmlns:a16="http://schemas.microsoft.com/office/drawing/2014/main" val="10009"/>
                   </a:ext>
                 </a:extLst>
               </a:tr>
@@ -19521,7 +19521,7 @@
                 </a:tc>
                 <a:extLst>
                   <a:ext uri="{0D108BD9-81ED-4DB2-BD59-A6C34878D82A}">
-                    <a16:rowId xmlns:a16="http://schemas.microsoft.com/office/drawing/2014/main" xmlns="" val="10010"/>
+                    <a16:rowId xmlns="" xmlns:a16="http://schemas.microsoft.com/office/drawing/2014/main" val="10010"/>
                   </a:ext>
                 </a:extLst>
               </a:tr>
@@ -19726,28 +19726,28 @@
                 <a:gridCol w="1220900">
                   <a:extLst>
                     <a:ext uri="{9D8B030D-6E8A-4147-A177-3AD203B41FA5}">
-                      <a16:colId xmlns:a16="http://schemas.microsoft.com/office/drawing/2014/main" xmlns="" val="20001"/>
+                      <a16:colId xmlns="" xmlns:a16="http://schemas.microsoft.com/office/drawing/2014/main" val="20001"/>
                     </a:ext>
                   </a:extLst>
                 </a:gridCol>
                 <a:gridCol w="1512168">
                   <a:extLst>
                     <a:ext uri="{9D8B030D-6E8A-4147-A177-3AD203B41FA5}">
-                      <a16:colId xmlns:a16="http://schemas.microsoft.com/office/drawing/2014/main" xmlns="" val="20002"/>
+                      <a16:colId xmlns="" xmlns:a16="http://schemas.microsoft.com/office/drawing/2014/main" val="20002"/>
                     </a:ext>
                   </a:extLst>
                 </a:gridCol>
                 <a:gridCol w="5251135">
                   <a:extLst>
                     <a:ext uri="{9D8B030D-6E8A-4147-A177-3AD203B41FA5}">
-                      <a16:colId xmlns:a16="http://schemas.microsoft.com/office/drawing/2014/main" xmlns="" val="20003"/>
+                      <a16:colId xmlns="" xmlns:a16="http://schemas.microsoft.com/office/drawing/2014/main" val="20003"/>
                     </a:ext>
                   </a:extLst>
                 </a:gridCol>
                 <a:gridCol w="653520">
                   <a:extLst>
                     <a:ext uri="{9D8B030D-6E8A-4147-A177-3AD203B41FA5}">
-                      <a16:colId xmlns:a16="http://schemas.microsoft.com/office/drawing/2014/main" xmlns="" val="20004"/>
+                      <a16:colId xmlns="" xmlns:a16="http://schemas.microsoft.com/office/drawing/2014/main" val="20004"/>
                     </a:ext>
                   </a:extLst>
                 </a:gridCol>
@@ -19920,7 +19920,7 @@
                 </a:tc>
                 <a:extLst>
                   <a:ext uri="{0D108BD9-81ED-4DB2-BD59-A6C34878D82A}">
-                    <a16:rowId xmlns:a16="http://schemas.microsoft.com/office/drawing/2014/main" xmlns="" val="10000"/>
+                    <a16:rowId xmlns="" xmlns:a16="http://schemas.microsoft.com/office/drawing/2014/main" val="10000"/>
                   </a:ext>
                 </a:extLst>
               </a:tr>
@@ -20143,7 +20143,7 @@
                 </a:tc>
                 <a:extLst>
                   <a:ext uri="{0D108BD9-81ED-4DB2-BD59-A6C34878D82A}">
-                    <a16:rowId xmlns:a16="http://schemas.microsoft.com/office/drawing/2014/main" xmlns="" val="10001"/>
+                    <a16:rowId xmlns="" xmlns:a16="http://schemas.microsoft.com/office/drawing/2014/main" val="10001"/>
                   </a:ext>
                 </a:extLst>
               </a:tr>
@@ -20310,7 +20310,7 @@
                 </a:tc>
                 <a:extLst>
                   <a:ext uri="{0D108BD9-81ED-4DB2-BD59-A6C34878D82A}">
-                    <a16:rowId xmlns:a16="http://schemas.microsoft.com/office/drawing/2014/main" xmlns="" val="10002"/>
+                    <a16:rowId xmlns="" xmlns:a16="http://schemas.microsoft.com/office/drawing/2014/main" val="10002"/>
                   </a:ext>
                 </a:extLst>
               </a:tr>
@@ -20421,7 +20421,7 @@
                 </a:tc>
                 <a:extLst>
                   <a:ext uri="{0D108BD9-81ED-4DB2-BD59-A6C34878D82A}">
-                    <a16:rowId xmlns:a16="http://schemas.microsoft.com/office/drawing/2014/main" xmlns="" val="10003"/>
+                    <a16:rowId xmlns="" xmlns:a16="http://schemas.microsoft.com/office/drawing/2014/main" val="10003"/>
                   </a:ext>
                 </a:extLst>
               </a:tr>
@@ -20587,7 +20587,7 @@
                 </a:tc>
                 <a:extLst>
                   <a:ext uri="{0D108BD9-81ED-4DB2-BD59-A6C34878D82A}">
-                    <a16:rowId xmlns:a16="http://schemas.microsoft.com/office/drawing/2014/main" xmlns="" val="10004"/>
+                    <a16:rowId xmlns="" xmlns:a16="http://schemas.microsoft.com/office/drawing/2014/main" val="10004"/>
                   </a:ext>
                 </a:extLst>
               </a:tr>
@@ -20714,7 +20714,7 @@
                 </a:tc>
                 <a:extLst>
                   <a:ext uri="{0D108BD9-81ED-4DB2-BD59-A6C34878D82A}">
-                    <a16:rowId xmlns:a16="http://schemas.microsoft.com/office/drawing/2014/main" xmlns="" val="10005"/>
+                    <a16:rowId xmlns="" xmlns:a16="http://schemas.microsoft.com/office/drawing/2014/main" val="10005"/>
                   </a:ext>
                 </a:extLst>
               </a:tr>
@@ -20817,7 +20817,7 @@
                 </a:tc>
                 <a:extLst>
                   <a:ext uri="{0D108BD9-81ED-4DB2-BD59-A6C34878D82A}">
-                    <a16:rowId xmlns:a16="http://schemas.microsoft.com/office/drawing/2014/main" xmlns="" val="10006"/>
+                    <a16:rowId xmlns="" xmlns:a16="http://schemas.microsoft.com/office/drawing/2014/main" val="10006"/>
                   </a:ext>
                 </a:extLst>
               </a:tr>
@@ -20974,28 +20974,28 @@
                 <a:gridCol w="1203476">
                   <a:extLst>
                     <a:ext uri="{9D8B030D-6E8A-4147-A177-3AD203B41FA5}">
-                      <a16:colId xmlns:a16="http://schemas.microsoft.com/office/drawing/2014/main" xmlns="" val="20001"/>
+                      <a16:colId xmlns="" xmlns:a16="http://schemas.microsoft.com/office/drawing/2014/main" val="20001"/>
                     </a:ext>
                   </a:extLst>
                 </a:gridCol>
                 <a:gridCol w="1662238">
                   <a:extLst>
                     <a:ext uri="{9D8B030D-6E8A-4147-A177-3AD203B41FA5}">
-                      <a16:colId xmlns:a16="http://schemas.microsoft.com/office/drawing/2014/main" xmlns="" val="20002"/>
+                      <a16:colId xmlns="" xmlns:a16="http://schemas.microsoft.com/office/drawing/2014/main" val="20002"/>
                     </a:ext>
                   </a:extLst>
                 </a:gridCol>
                 <a:gridCol w="5055166">
                   <a:extLst>
                     <a:ext uri="{9D8B030D-6E8A-4147-A177-3AD203B41FA5}">
-                      <a16:colId xmlns:a16="http://schemas.microsoft.com/office/drawing/2014/main" xmlns="" val="20003"/>
+                      <a16:colId xmlns="" xmlns:a16="http://schemas.microsoft.com/office/drawing/2014/main" val="20003"/>
                     </a:ext>
                   </a:extLst>
                 </a:gridCol>
                 <a:gridCol w="648073">
                   <a:extLst>
                     <a:ext uri="{9D8B030D-6E8A-4147-A177-3AD203B41FA5}">
-                      <a16:colId xmlns:a16="http://schemas.microsoft.com/office/drawing/2014/main" xmlns="" val="20004"/>
+                      <a16:colId xmlns="" xmlns:a16="http://schemas.microsoft.com/office/drawing/2014/main" val="20004"/>
                     </a:ext>
                   </a:extLst>
                 </a:gridCol>
@@ -21168,7 +21168,7 @@
                 </a:tc>
                 <a:extLst>
                   <a:ext uri="{0D108BD9-81ED-4DB2-BD59-A6C34878D82A}">
-                    <a16:rowId xmlns:a16="http://schemas.microsoft.com/office/drawing/2014/main" xmlns="" val="10000"/>
+                    <a16:rowId xmlns="" xmlns:a16="http://schemas.microsoft.com/office/drawing/2014/main" val="10000"/>
                   </a:ext>
                 </a:extLst>
               </a:tr>
@@ -21295,7 +21295,7 @@
                 </a:tc>
                 <a:extLst>
                   <a:ext uri="{0D108BD9-81ED-4DB2-BD59-A6C34878D82A}">
-                    <a16:rowId xmlns:a16="http://schemas.microsoft.com/office/drawing/2014/main" xmlns="" val="10001"/>
+                    <a16:rowId xmlns="" xmlns:a16="http://schemas.microsoft.com/office/drawing/2014/main" val="10001"/>
                   </a:ext>
                 </a:extLst>
               </a:tr>
@@ -21502,7 +21502,7 @@
                 </a:tc>
                 <a:extLst>
                   <a:ext uri="{0D108BD9-81ED-4DB2-BD59-A6C34878D82A}">
-                    <a16:rowId xmlns:a16="http://schemas.microsoft.com/office/drawing/2014/main" xmlns="" val="10002"/>
+                    <a16:rowId xmlns="" xmlns:a16="http://schemas.microsoft.com/office/drawing/2014/main" val="10002"/>
                   </a:ext>
                 </a:extLst>
               </a:tr>
@@ -21637,7 +21637,7 @@
                 </a:tc>
                 <a:extLst>
                   <a:ext uri="{0D108BD9-81ED-4DB2-BD59-A6C34878D82A}">
-                    <a16:rowId xmlns:a16="http://schemas.microsoft.com/office/drawing/2014/main" xmlns="" val="10003"/>
+                    <a16:rowId xmlns="" xmlns:a16="http://schemas.microsoft.com/office/drawing/2014/main" val="10003"/>
                   </a:ext>
                 </a:extLst>
               </a:tr>
@@ -21740,7 +21740,7 @@
                 </a:tc>
                 <a:extLst>
                   <a:ext uri="{0D108BD9-81ED-4DB2-BD59-A6C34878D82A}">
-                    <a16:rowId xmlns:a16="http://schemas.microsoft.com/office/drawing/2014/main" xmlns="" val="10004"/>
+                    <a16:rowId xmlns="" xmlns:a16="http://schemas.microsoft.com/office/drawing/2014/main" val="10004"/>
                   </a:ext>
                 </a:extLst>
               </a:tr>
@@ -21867,7 +21867,7 @@
                 </a:tc>
                 <a:extLst>
                   <a:ext uri="{0D108BD9-81ED-4DB2-BD59-A6C34878D82A}">
-                    <a16:rowId xmlns:a16="http://schemas.microsoft.com/office/drawing/2014/main" xmlns="" val="10005"/>
+                    <a16:rowId xmlns="" xmlns:a16="http://schemas.microsoft.com/office/drawing/2014/main" val="10005"/>
                   </a:ext>
                 </a:extLst>
               </a:tr>
@@ -21994,7 +21994,7 @@
                 </a:tc>
                 <a:extLst>
                   <a:ext uri="{0D108BD9-81ED-4DB2-BD59-A6C34878D82A}">
-                    <a16:rowId xmlns:a16="http://schemas.microsoft.com/office/drawing/2014/main" xmlns="" val="10006"/>
+                    <a16:rowId xmlns="" xmlns:a16="http://schemas.microsoft.com/office/drawing/2014/main" val="10006"/>
                   </a:ext>
                 </a:extLst>
               </a:tr>
@@ -22089,7 +22089,7 @@
                 </a:tc>
                 <a:extLst>
                   <a:ext uri="{0D108BD9-81ED-4DB2-BD59-A6C34878D82A}">
-                    <a16:rowId xmlns:a16="http://schemas.microsoft.com/office/drawing/2014/main" xmlns="" val="10007"/>
+                    <a16:rowId xmlns="" xmlns:a16="http://schemas.microsoft.com/office/drawing/2014/main" val="10007"/>
                   </a:ext>
                 </a:extLst>
               </a:tr>
@@ -29829,42 +29829,42 @@
                 <a:gridCol w="2075016">
                   <a:extLst>
                     <a:ext uri="{9D8B030D-6E8A-4147-A177-3AD203B41FA5}">
-                      <a16:colId xmlns:a16="http://schemas.microsoft.com/office/drawing/2014/main" xmlns="" val="20001"/>
+                      <a16:colId xmlns="" xmlns:a16="http://schemas.microsoft.com/office/drawing/2014/main" val="20001"/>
                     </a:ext>
                   </a:extLst>
                 </a:gridCol>
                 <a:gridCol w="936104">
                   <a:extLst>
                     <a:ext uri="{9D8B030D-6E8A-4147-A177-3AD203B41FA5}">
-                      <a16:colId xmlns:a16="http://schemas.microsoft.com/office/drawing/2014/main" xmlns="" val="20002"/>
+                      <a16:colId xmlns="" xmlns:a16="http://schemas.microsoft.com/office/drawing/2014/main" val="20002"/>
                     </a:ext>
                   </a:extLst>
                 </a:gridCol>
                 <a:gridCol w="792088">
                   <a:extLst>
                     <a:ext uri="{9D8B030D-6E8A-4147-A177-3AD203B41FA5}">
-                      <a16:colId xmlns:a16="http://schemas.microsoft.com/office/drawing/2014/main" xmlns="" val="20003"/>
+                      <a16:colId xmlns="" xmlns:a16="http://schemas.microsoft.com/office/drawing/2014/main" val="20003"/>
                     </a:ext>
                   </a:extLst>
                 </a:gridCol>
                 <a:gridCol w="1368152">
                   <a:extLst>
                     <a:ext uri="{9D8B030D-6E8A-4147-A177-3AD203B41FA5}">
-                      <a16:colId xmlns:a16="http://schemas.microsoft.com/office/drawing/2014/main" xmlns="" val="410757781"/>
+                      <a16:colId xmlns="" xmlns:a16="http://schemas.microsoft.com/office/drawing/2014/main" val="410757781"/>
                     </a:ext>
                   </a:extLst>
                 </a:gridCol>
                 <a:gridCol w="1296144">
                   <a:extLst>
                     <a:ext uri="{9D8B030D-6E8A-4147-A177-3AD203B41FA5}">
-                      <a16:colId xmlns:a16="http://schemas.microsoft.com/office/drawing/2014/main" xmlns="" val="4008089202"/>
+                      <a16:colId xmlns="" xmlns:a16="http://schemas.microsoft.com/office/drawing/2014/main" val="4008089202"/>
                     </a:ext>
                   </a:extLst>
                 </a:gridCol>
                 <a:gridCol w="1440159">
                   <a:extLst>
                     <a:ext uri="{9D8B030D-6E8A-4147-A177-3AD203B41FA5}">
-                      <a16:colId xmlns:a16="http://schemas.microsoft.com/office/drawing/2014/main" xmlns="" val="1952235814"/>
+                      <a16:colId xmlns="" xmlns:a16="http://schemas.microsoft.com/office/drawing/2014/main" val="1952235814"/>
                     </a:ext>
                   </a:extLst>
                 </a:gridCol>
@@ -30103,7 +30103,7 @@
                 </a:tc>
                 <a:extLst>
                   <a:ext uri="{0D108BD9-81ED-4DB2-BD59-A6C34878D82A}">
-                    <a16:rowId xmlns:a16="http://schemas.microsoft.com/office/drawing/2014/main" xmlns="" val="10000"/>
+                    <a16:rowId xmlns="" xmlns:a16="http://schemas.microsoft.com/office/drawing/2014/main" val="10000"/>
                   </a:ext>
                 </a:extLst>
               </a:tr>
@@ -30280,7 +30280,7 @@
                 </a:tc>
                 <a:extLst>
                   <a:ext uri="{0D108BD9-81ED-4DB2-BD59-A6C34878D82A}">
-                    <a16:rowId xmlns:a16="http://schemas.microsoft.com/office/drawing/2014/main" xmlns="" val="10001"/>
+                    <a16:rowId xmlns="" xmlns:a16="http://schemas.microsoft.com/office/drawing/2014/main" val="10001"/>
                   </a:ext>
                 </a:extLst>
               </a:tr>
@@ -30439,7 +30439,7 @@
                 </a:tc>
                 <a:extLst>
                   <a:ext uri="{0D108BD9-81ED-4DB2-BD59-A6C34878D82A}">
-                    <a16:rowId xmlns:a16="http://schemas.microsoft.com/office/drawing/2014/main" xmlns="" val="10002"/>
+                    <a16:rowId xmlns="" xmlns:a16="http://schemas.microsoft.com/office/drawing/2014/main" val="10002"/>
                   </a:ext>
                 </a:extLst>
               </a:tr>
@@ -30610,7 +30610,7 @@
                 </a:tc>
                 <a:extLst>
                   <a:ext uri="{0D108BD9-81ED-4DB2-BD59-A6C34878D82A}">
-                    <a16:rowId xmlns:a16="http://schemas.microsoft.com/office/drawing/2014/main" xmlns="" val="10003"/>
+                    <a16:rowId xmlns="" xmlns:a16="http://schemas.microsoft.com/office/drawing/2014/main" val="10003"/>
                   </a:ext>
                 </a:extLst>
               </a:tr>
@@ -30781,7 +30781,7 @@
                 </a:tc>
                 <a:extLst>
                   <a:ext uri="{0D108BD9-81ED-4DB2-BD59-A6C34878D82A}">
-                    <a16:rowId xmlns:a16="http://schemas.microsoft.com/office/drawing/2014/main" xmlns="" val="10004"/>
+                    <a16:rowId xmlns="" xmlns:a16="http://schemas.microsoft.com/office/drawing/2014/main" val="10004"/>
                   </a:ext>
                 </a:extLst>
               </a:tr>
@@ -30963,7 +30963,7 @@
                 </a:tc>
                 <a:extLst>
                   <a:ext uri="{0D108BD9-81ED-4DB2-BD59-A6C34878D82A}">
-                    <a16:rowId xmlns:a16="http://schemas.microsoft.com/office/drawing/2014/main" xmlns="" val="10005"/>
+                    <a16:rowId xmlns="" xmlns:a16="http://schemas.microsoft.com/office/drawing/2014/main" val="10005"/>
                   </a:ext>
                 </a:extLst>
               </a:tr>
@@ -31134,7 +31134,7 @@
                 </a:tc>
                 <a:extLst>
                   <a:ext uri="{0D108BD9-81ED-4DB2-BD59-A6C34878D82A}">
-                    <a16:rowId xmlns:a16="http://schemas.microsoft.com/office/drawing/2014/main" xmlns="" val="10006"/>
+                    <a16:rowId xmlns="" xmlns:a16="http://schemas.microsoft.com/office/drawing/2014/main" val="10006"/>
                   </a:ext>
                 </a:extLst>
               </a:tr>
@@ -31302,7 +31302,7 @@
                 </a:tc>
                 <a:extLst>
                   <a:ext uri="{0D108BD9-81ED-4DB2-BD59-A6C34878D82A}">
-                    <a16:rowId xmlns:a16="http://schemas.microsoft.com/office/drawing/2014/main" xmlns="" val="10007"/>
+                    <a16:rowId xmlns="" xmlns:a16="http://schemas.microsoft.com/office/drawing/2014/main" val="10007"/>
                   </a:ext>
                 </a:extLst>
               </a:tr>
@@ -31496,7 +31496,7 @@
                 </a:tc>
                 <a:extLst>
                   <a:ext uri="{0D108BD9-81ED-4DB2-BD59-A6C34878D82A}">
-                    <a16:rowId xmlns:a16="http://schemas.microsoft.com/office/drawing/2014/main" xmlns="" val="10008"/>
+                    <a16:rowId xmlns="" xmlns:a16="http://schemas.microsoft.com/office/drawing/2014/main" val="10008"/>
                   </a:ext>
                 </a:extLst>
               </a:tr>
@@ -31655,7 +31655,7 @@
                 </a:tc>
                 <a:extLst>
                   <a:ext uri="{0D108BD9-81ED-4DB2-BD59-A6C34878D82A}">
-                    <a16:rowId xmlns:a16="http://schemas.microsoft.com/office/drawing/2014/main" xmlns="" val="1324333913"/>
+                    <a16:rowId xmlns="" xmlns:a16="http://schemas.microsoft.com/office/drawing/2014/main" val="1324333913"/>
                   </a:ext>
                 </a:extLst>
               </a:tr>
@@ -31826,7 +31826,7 @@
                 </a:tc>
                 <a:extLst>
                   <a:ext uri="{0D108BD9-81ED-4DB2-BD59-A6C34878D82A}">
-                    <a16:rowId xmlns:a16="http://schemas.microsoft.com/office/drawing/2014/main" xmlns="" val="1727322289"/>
+                    <a16:rowId xmlns="" xmlns:a16="http://schemas.microsoft.com/office/drawing/2014/main" val="1727322289"/>
                   </a:ext>
                 </a:extLst>
               </a:tr>
@@ -31997,7 +31997,7 @@
                 </a:tc>
                 <a:extLst>
                   <a:ext uri="{0D108BD9-81ED-4DB2-BD59-A6C34878D82A}">
-                    <a16:rowId xmlns:a16="http://schemas.microsoft.com/office/drawing/2014/main" xmlns="" val="1732334936"/>
+                    <a16:rowId xmlns="" xmlns:a16="http://schemas.microsoft.com/office/drawing/2014/main" val="1732334936"/>
                   </a:ext>
                 </a:extLst>
               </a:tr>
@@ -32179,7 +32179,7 @@
                 </a:tc>
                 <a:extLst>
                   <a:ext uri="{0D108BD9-81ED-4DB2-BD59-A6C34878D82A}">
-                    <a16:rowId xmlns:a16="http://schemas.microsoft.com/office/drawing/2014/main" xmlns="" val="3887831580"/>
+                    <a16:rowId xmlns="" xmlns:a16="http://schemas.microsoft.com/office/drawing/2014/main" val="3887831580"/>
                   </a:ext>
                 </a:extLst>
               </a:tr>
@@ -32350,7 +32350,7 @@
                 </a:tc>
                 <a:extLst>
                   <a:ext uri="{0D108BD9-81ED-4DB2-BD59-A6C34878D82A}">
-                    <a16:rowId xmlns:a16="http://schemas.microsoft.com/office/drawing/2014/main" xmlns="" val="2397129623"/>
+                    <a16:rowId xmlns="" xmlns:a16="http://schemas.microsoft.com/office/drawing/2014/main" val="2397129623"/>
                   </a:ext>
                 </a:extLst>
               </a:tr>
@@ -35424,7 +35424,7 @@
           <p:cNvPr id="7" name="직사각형 42">
             <a:extLst>
               <a:ext uri="{FF2B5EF4-FFF2-40B4-BE49-F238E27FC236}">
-                <a16:creationId xmlns:a16="http://schemas.microsoft.com/office/drawing/2014/main" xmlns="" id="{8B732A0B-8794-4D6F-8FB1-2A615F6491AF}"/>
+                <a16:creationId xmlns="" xmlns:a16="http://schemas.microsoft.com/office/drawing/2014/main" id="{8B732A0B-8794-4D6F-8FB1-2A615F6491AF}"/>
               </a:ext>
             </a:extLst>
           </p:cNvPr>
@@ -35485,7 +35485,7 @@
           <p:cNvPr id="8" name="직사각형 42">
             <a:extLst>
               <a:ext uri="{FF2B5EF4-FFF2-40B4-BE49-F238E27FC236}">
-                <a16:creationId xmlns:a16="http://schemas.microsoft.com/office/drawing/2014/main" xmlns="" id="{9BD0AFB8-07AD-46B3-8A8C-8F5626B992D4}"/>
+                <a16:creationId xmlns="" xmlns:a16="http://schemas.microsoft.com/office/drawing/2014/main" id="{9BD0AFB8-07AD-46B3-8A8C-8F5626B992D4}"/>
               </a:ext>
             </a:extLst>
           </p:cNvPr>
@@ -35546,7 +35546,7 @@
           <p:cNvPr id="10" name="직사각형 42">
             <a:extLst>
               <a:ext uri="{FF2B5EF4-FFF2-40B4-BE49-F238E27FC236}">
-                <a16:creationId xmlns:a16="http://schemas.microsoft.com/office/drawing/2014/main" xmlns="" id="{659B2C0F-8D66-437F-9A45-126C41D32DED}"/>
+                <a16:creationId xmlns="" xmlns:a16="http://schemas.microsoft.com/office/drawing/2014/main" id="{659B2C0F-8D66-437F-9A45-126C41D32DED}"/>
               </a:ext>
             </a:extLst>
           </p:cNvPr>
@@ -35680,7 +35680,7 @@
           <p:cNvPr id="11" name="직사각형 42">
             <a:extLst>
               <a:ext uri="{FF2B5EF4-FFF2-40B4-BE49-F238E27FC236}">
-                <a16:creationId xmlns:a16="http://schemas.microsoft.com/office/drawing/2014/main" xmlns="" id="{EABD93CA-FE0D-4A80-AA49-00998EFFE9CD}"/>
+                <a16:creationId xmlns="" xmlns:a16="http://schemas.microsoft.com/office/drawing/2014/main" id="{EABD93CA-FE0D-4A80-AA49-00998EFFE9CD}"/>
               </a:ext>
             </a:extLst>
           </p:cNvPr>
@@ -36304,21 +36304,21 @@
                 <a:gridCol w="1512168">
                   <a:extLst>
                     <a:ext uri="{9D8B030D-6E8A-4147-A177-3AD203B41FA5}">
-                      <a16:colId xmlns:a16="http://schemas.microsoft.com/office/drawing/2014/main" xmlns="" val="20000"/>
+                      <a16:colId xmlns="" xmlns:a16="http://schemas.microsoft.com/office/drawing/2014/main" val="20000"/>
                     </a:ext>
                   </a:extLst>
                 </a:gridCol>
                 <a:gridCol w="3312368">
                   <a:extLst>
                     <a:ext uri="{9D8B030D-6E8A-4147-A177-3AD203B41FA5}">
-                      <a16:colId xmlns:a16="http://schemas.microsoft.com/office/drawing/2014/main" xmlns="" val="20001"/>
+                      <a16:colId xmlns="" xmlns:a16="http://schemas.microsoft.com/office/drawing/2014/main" val="20001"/>
                     </a:ext>
                   </a:extLst>
                 </a:gridCol>
                 <a:gridCol w="3744416">
                   <a:extLst>
                     <a:ext uri="{9D8B030D-6E8A-4147-A177-3AD203B41FA5}">
-                      <a16:colId xmlns:a16="http://schemas.microsoft.com/office/drawing/2014/main" xmlns="" val="20002"/>
+                      <a16:colId xmlns="" xmlns:a16="http://schemas.microsoft.com/office/drawing/2014/main" val="20002"/>
                     </a:ext>
                   </a:extLst>
                 </a:gridCol>
@@ -36372,7 +36372,7 @@
                 </a:tc>
                 <a:extLst>
                   <a:ext uri="{0D108BD9-81ED-4DB2-BD59-A6C34878D82A}">
-                    <a16:rowId xmlns:a16="http://schemas.microsoft.com/office/drawing/2014/main" xmlns="" val="10000"/>
+                    <a16:rowId xmlns="" xmlns:a16="http://schemas.microsoft.com/office/drawing/2014/main" val="10000"/>
                   </a:ext>
                 </a:extLst>
               </a:tr>
@@ -36537,7 +36537,7 @@
                 </a:tc>
                 <a:extLst>
                   <a:ext uri="{0D108BD9-81ED-4DB2-BD59-A6C34878D82A}">
-                    <a16:rowId xmlns:a16="http://schemas.microsoft.com/office/drawing/2014/main" xmlns="" val="10001"/>
+                    <a16:rowId xmlns="" xmlns:a16="http://schemas.microsoft.com/office/drawing/2014/main" val="10001"/>
                   </a:ext>
                 </a:extLst>
               </a:tr>
@@ -36614,7 +36614,7 @@
                 </a:tc>
                 <a:extLst>
                   <a:ext uri="{0D108BD9-81ED-4DB2-BD59-A6C34878D82A}">
-                    <a16:rowId xmlns:a16="http://schemas.microsoft.com/office/drawing/2014/main" xmlns="" val="10002"/>
+                    <a16:rowId xmlns="" xmlns:a16="http://schemas.microsoft.com/office/drawing/2014/main" val="10002"/>
                   </a:ext>
                 </a:extLst>
               </a:tr>
@@ -36786,7 +36786,7 @@
                 </a:tc>
                 <a:extLst>
                   <a:ext uri="{0D108BD9-81ED-4DB2-BD59-A6C34878D82A}">
-                    <a16:rowId xmlns:a16="http://schemas.microsoft.com/office/drawing/2014/main" xmlns="" val="10003"/>
+                    <a16:rowId xmlns="" xmlns:a16="http://schemas.microsoft.com/office/drawing/2014/main" val="10003"/>
                   </a:ext>
                 </a:extLst>
               </a:tr>
@@ -36965,7 +36965,7 @@
                 </a:tc>
                 <a:extLst>
                   <a:ext uri="{0D108BD9-81ED-4DB2-BD59-A6C34878D82A}">
-                    <a16:rowId xmlns:a16="http://schemas.microsoft.com/office/drawing/2014/main" xmlns="" val="10004"/>
+                    <a16:rowId xmlns="" xmlns:a16="http://schemas.microsoft.com/office/drawing/2014/main" val="10004"/>
                   </a:ext>
                 </a:extLst>
               </a:tr>
@@ -37123,7 +37123,7 @@
                 </a:tc>
                 <a:extLst>
                   <a:ext uri="{0D108BD9-81ED-4DB2-BD59-A6C34878D82A}">
-                    <a16:rowId xmlns:a16="http://schemas.microsoft.com/office/drawing/2014/main" xmlns="" val="10005"/>
+                    <a16:rowId xmlns="" xmlns:a16="http://schemas.microsoft.com/office/drawing/2014/main" val="10005"/>
                   </a:ext>
                 </a:extLst>
               </a:tr>
@@ -37242,7 +37242,7 @@
                 </a:tc>
                 <a:extLst>
                   <a:ext uri="{0D108BD9-81ED-4DB2-BD59-A6C34878D82A}">
-                    <a16:rowId xmlns:a16="http://schemas.microsoft.com/office/drawing/2014/main" xmlns="" val="10006"/>
+                    <a16:rowId xmlns="" xmlns:a16="http://schemas.microsoft.com/office/drawing/2014/main" val="10006"/>
                   </a:ext>
                 </a:extLst>
               </a:tr>
@@ -37340,7 +37340,7 @@
                 </a:tc>
                 <a:extLst>
                   <a:ext uri="{0D108BD9-81ED-4DB2-BD59-A6C34878D82A}">
-                    <a16:rowId xmlns:a16="http://schemas.microsoft.com/office/drawing/2014/main" xmlns="" val="10007"/>
+                    <a16:rowId xmlns="" xmlns:a16="http://schemas.microsoft.com/office/drawing/2014/main" val="10007"/>
                   </a:ext>
                 </a:extLst>
               </a:tr>
@@ -37403,7 +37403,7 @@
                 </a:tc>
                 <a:extLst>
                   <a:ext uri="{0D108BD9-81ED-4DB2-BD59-A6C34878D82A}">
-                    <a16:rowId xmlns:a16="http://schemas.microsoft.com/office/drawing/2014/main" xmlns="" val="10008"/>
+                    <a16:rowId xmlns="" xmlns:a16="http://schemas.microsoft.com/office/drawing/2014/main" val="10008"/>
                   </a:ext>
                 </a:extLst>
               </a:tr>
@@ -37462,7 +37462,7 @@
                 </a:tc>
                 <a:extLst>
                   <a:ext uri="{0D108BD9-81ED-4DB2-BD59-A6C34878D82A}">
-                    <a16:rowId xmlns:a16="http://schemas.microsoft.com/office/drawing/2014/main" xmlns="" val="10009"/>
+                    <a16:rowId xmlns="" xmlns:a16="http://schemas.microsoft.com/office/drawing/2014/main" val="10009"/>
                   </a:ext>
                 </a:extLst>
               </a:tr>
@@ -37553,7 +37553,7 @@
                 </a:tc>
                 <a:extLst>
                   <a:ext uri="{0D108BD9-81ED-4DB2-BD59-A6C34878D82A}">
-                    <a16:rowId xmlns:a16="http://schemas.microsoft.com/office/drawing/2014/main" xmlns="" val="10010"/>
+                    <a16:rowId xmlns="" xmlns:a16="http://schemas.microsoft.com/office/drawing/2014/main" val="10010"/>
                   </a:ext>
                 </a:extLst>
               </a:tr>
@@ -37605,7 +37605,7 @@
                 </a:tc>
                 <a:extLst>
                   <a:ext uri="{0D108BD9-81ED-4DB2-BD59-A6C34878D82A}">
-                    <a16:rowId xmlns:a16="http://schemas.microsoft.com/office/drawing/2014/main" xmlns="" val="10011"/>
+                    <a16:rowId xmlns="" xmlns:a16="http://schemas.microsoft.com/office/drawing/2014/main" val="10011"/>
                   </a:ext>
                 </a:extLst>
               </a:tr>
@@ -38031,7 +38031,7 @@
           <p:nvPr>
             <p:extLst>
               <p:ext uri="{D42A27DB-BD31-4B8C-83A1-F6EECF244321}">
-                <p14:modId xmlns:p14="http://schemas.microsoft.com/office/powerpoint/2010/main" val="3097806154"/>
+                <p14:modId xmlns:p14="http://schemas.microsoft.com/office/powerpoint/2010/main" val="1013888734"/>
               </p:ext>
             </p:extLst>
           </p:nvPr>
@@ -38050,17 +38050,18 @@
                 <a:gridCol w="1512168">
                   <a:extLst>
                     <a:ext uri="{9D8B030D-6E8A-4147-A177-3AD203B41FA5}">
-                      <a16:colId xmlns:a16="http://schemas.microsoft.com/office/drawing/2014/main" xmlns="" val="20000"/>
+                      <a16:colId xmlns="" xmlns:a16="http://schemas.microsoft.com/office/drawing/2014/main" val="20000"/>
                     </a:ext>
                   </a:extLst>
                 </a:gridCol>
-                <a:gridCol w="7056784">
+                <a:gridCol w="3528392">
                   <a:extLst>
                     <a:ext uri="{9D8B030D-6E8A-4147-A177-3AD203B41FA5}">
-                      <a16:colId xmlns:a16="http://schemas.microsoft.com/office/drawing/2014/main" xmlns="" val="20001"/>
+                      <a16:colId xmlns="" xmlns:a16="http://schemas.microsoft.com/office/drawing/2014/main" val="20001"/>
                     </a:ext>
                   </a:extLst>
                 </a:gridCol>
+                <a:gridCol w="3528392"/>
               </a:tblGrid>
               <a:tr h="321207">
                 <a:tc>
@@ -38102,6 +38103,41 @@
                           <a:latin typeface="나눔바른고딕" pitchFamily="50" charset="-127"/>
                           <a:ea typeface="나눔바른고딕" pitchFamily="50" charset="-127"/>
                         </a:rPr>
+                        <a:t>이름</a:t>
+                      </a:r>
+                      <a:endParaRPr lang="ko-KR" altLang="en-US" dirty="0">
+                        <a:latin typeface="나눔바른고딕" pitchFamily="50" charset="-127"/>
+                        <a:ea typeface="나눔바른고딕" pitchFamily="50" charset="-127"/>
+                      </a:endParaRPr>
+                    </a:p>
+                  </a:txBody>
+                  <a:tcPr/>
+                </a:tc>
+                <a:tc>
+                  <a:txBody>
+                    <a:bodyPr/>
+                    <a:lstStyle/>
+                    <a:p>
+                      <a:pPr algn="ctr" latinLnBrk="1"/>
+                      <a:r>
+                        <a:rPr lang="en-US" altLang="ko-KR" dirty="0" smtClean="0">
+                          <a:latin typeface="나눔바른고딕" pitchFamily="50" charset="-127"/>
+                          <a:ea typeface="나눔바른고딕" pitchFamily="50" charset="-127"/>
+                        </a:rPr>
+                        <a:t>SEQUENCE</a:t>
+                      </a:r>
+                      <a:r>
+                        <a:rPr lang="en-US" altLang="ko-KR" baseline="0" dirty="0" smtClean="0">
+                          <a:latin typeface="나눔바른고딕" pitchFamily="50" charset="-127"/>
+                          <a:ea typeface="나눔바른고딕" pitchFamily="50" charset="-127"/>
+                        </a:rPr>
+                        <a:t> </a:t>
+                      </a:r>
+                      <a:r>
+                        <a:rPr lang="ko-KR" altLang="en-US" baseline="0" dirty="0" smtClean="0">
+                          <a:latin typeface="나눔바른고딕" pitchFamily="50" charset="-127"/>
+                          <a:ea typeface="나눔바른고딕" pitchFamily="50" charset="-127"/>
+                        </a:rPr>
                         <a:t>시작 번호</a:t>
                       </a:r>
                       <a:endParaRPr lang="ko-KR" altLang="en-US" dirty="0">
@@ -38114,7 +38150,7 @@
                 </a:tc>
                 <a:extLst>
                   <a:ext uri="{0D108BD9-81ED-4DB2-BD59-A6C34878D82A}">
-                    <a16:rowId xmlns:a16="http://schemas.microsoft.com/office/drawing/2014/main" xmlns="" val="10000"/>
+                    <a16:rowId xmlns="" xmlns:a16="http://schemas.microsoft.com/office/drawing/2014/main" val="10000"/>
                   </a:ext>
                 </a:extLst>
               </a:tr>
@@ -38147,6 +38183,32 @@
                     <a:p>
                       <a:pPr latinLnBrk="1"/>
                       <a:r>
+                        <a:rPr lang="en-US" altLang="ko-KR" sz="800" b="0" i="0" u="none" strike="noStrike" cap="none" dirty="0" err="1" smtClean="0">
+                          <a:solidFill>
+                            <a:srgbClr val="000000"/>
+                          </a:solidFill>
+                          <a:latin typeface="Arial"/>
+                          <a:ea typeface="Arial"/>
+                          <a:cs typeface="Arial"/>
+                          <a:sym typeface="Arial"/>
+                        </a:rPr>
+                        <a:t>member_seq</a:t>
+                      </a:r>
+                      <a:endParaRPr lang="ko-KR" altLang="en-US" sz="800" dirty="0">
+                        <a:latin typeface="나눔바른고딕" pitchFamily="50" charset="-127"/>
+                        <a:ea typeface="나눔바른고딕" pitchFamily="50" charset="-127"/>
+                      </a:endParaRPr>
+                    </a:p>
+                  </a:txBody>
+                  <a:tcPr/>
+                </a:tc>
+                <a:tc>
+                  <a:txBody>
+                    <a:bodyPr/>
+                    <a:lstStyle/>
+                    <a:p>
+                      <a:pPr latinLnBrk="1"/>
+                      <a:r>
                         <a:rPr lang="en-US" altLang="ko-KR" sz="800" dirty="0" smtClean="0">
                           <a:latin typeface="나눔바른고딕" pitchFamily="50" charset="-127"/>
                           <a:ea typeface="나눔바른고딕" pitchFamily="50" charset="-127"/>
@@ -38163,7 +38225,7 @@
                 </a:tc>
                 <a:extLst>
                   <a:ext uri="{0D108BD9-81ED-4DB2-BD59-A6C34878D82A}">
-                    <a16:rowId xmlns:a16="http://schemas.microsoft.com/office/drawing/2014/main" xmlns="" val="10001"/>
+                    <a16:rowId xmlns="" xmlns:a16="http://schemas.microsoft.com/office/drawing/2014/main" val="10001"/>
                   </a:ext>
                 </a:extLst>
               </a:tr>
@@ -38196,6 +38258,32 @@
                     <a:p>
                       <a:pPr latinLnBrk="1"/>
                       <a:r>
+                        <a:rPr lang="en-US" altLang="ko-KR" sz="800" b="0" i="0" u="none" strike="noStrike" cap="none" dirty="0" err="1" smtClean="0">
+                          <a:solidFill>
+                            <a:srgbClr val="000000"/>
+                          </a:solidFill>
+                          <a:latin typeface="Arial"/>
+                          <a:ea typeface="Arial"/>
+                          <a:cs typeface="Arial"/>
+                          <a:sym typeface="Arial"/>
+                        </a:rPr>
+                        <a:t>balance_seq</a:t>
+                      </a:r>
+                      <a:endParaRPr lang="ko-KR" altLang="en-US" sz="800" dirty="0">
+                        <a:latin typeface="나눔바른고딕" pitchFamily="50" charset="-127"/>
+                        <a:ea typeface="나눔바른고딕" pitchFamily="50" charset="-127"/>
+                      </a:endParaRPr>
+                    </a:p>
+                  </a:txBody>
+                  <a:tcPr/>
+                </a:tc>
+                <a:tc>
+                  <a:txBody>
+                    <a:bodyPr/>
+                    <a:lstStyle/>
+                    <a:p>
+                      <a:pPr latinLnBrk="1"/>
+                      <a:r>
                         <a:rPr lang="en-US" altLang="ko-KR" sz="800" dirty="0" smtClean="0">
                           <a:latin typeface="나눔바른고딕" pitchFamily="50" charset="-127"/>
                           <a:ea typeface="나눔바른고딕" pitchFamily="50" charset="-127"/>
@@ -38212,7 +38300,7 @@
                 </a:tc>
                 <a:extLst>
                   <a:ext uri="{0D108BD9-81ED-4DB2-BD59-A6C34878D82A}">
-                    <a16:rowId xmlns:a16="http://schemas.microsoft.com/office/drawing/2014/main" xmlns="" val="10002"/>
+                    <a16:rowId xmlns="" xmlns:a16="http://schemas.microsoft.com/office/drawing/2014/main" val="10002"/>
                   </a:ext>
                 </a:extLst>
               </a:tr>
@@ -38247,6 +38335,46 @@
                           <a:ea typeface="나눔바른고딕" pitchFamily="50" charset="-127"/>
                         </a:rPr>
                         <a:t>메이커</a:t>
+                      </a:r>
+                    </a:p>
+                  </a:txBody>
+                  <a:tcPr/>
+                </a:tc>
+                <a:tc>
+                  <a:txBody>
+                    <a:bodyPr/>
+                    <a:lstStyle/>
+                    <a:p>
+                      <a:pPr marL="0" marR="0" indent="0" algn="l" defTabSz="914400" rtl="0" eaLnBrk="1" fontAlgn="auto" latinLnBrk="1" hangingPunct="1">
+                        <a:lnSpc>
+                          <a:spcPct val="100000"/>
+                        </a:lnSpc>
+                        <a:spcBef>
+                          <a:spcPts val="0"/>
+                        </a:spcBef>
+                        <a:spcAft>
+                          <a:spcPts val="0"/>
+                        </a:spcAft>
+                        <a:buClr>
+                          <a:srgbClr val="000000"/>
+                        </a:buClr>
+                        <a:buSzTx/>
+                        <a:buFont typeface="Arial"/>
+                        <a:buNone/>
+                        <a:tabLst/>
+                        <a:defRPr/>
+                      </a:pPr>
+                      <a:r>
+                        <a:rPr lang="en-US" altLang="ko-KR" sz="800" b="0" i="0" u="none" strike="noStrike" cap="none" dirty="0" err="1" smtClean="0">
+                          <a:solidFill>
+                            <a:srgbClr val="000000"/>
+                          </a:solidFill>
+                          <a:latin typeface="Arial"/>
+                          <a:ea typeface="Arial"/>
+                          <a:cs typeface="Arial"/>
+                          <a:sym typeface="Arial"/>
+                        </a:rPr>
+                        <a:t>maker_seq</a:t>
                       </a:r>
                       <a:endParaRPr lang="ko-KR" altLang="en-US" sz="800" dirty="0" smtClean="0">
                         <a:latin typeface="나눔바른고딕" pitchFamily="50" charset="-127"/>
@@ -38297,7 +38425,7 @@
                 </a:tc>
                 <a:extLst>
                   <a:ext uri="{0D108BD9-81ED-4DB2-BD59-A6C34878D82A}">
-                    <a16:rowId xmlns:a16="http://schemas.microsoft.com/office/drawing/2014/main" xmlns="" val="10003"/>
+                    <a16:rowId xmlns="" xmlns:a16="http://schemas.microsoft.com/office/drawing/2014/main" val="10003"/>
                   </a:ext>
                 </a:extLst>
               </a:tr>
@@ -38332,6 +38460,46 @@
                           <a:ea typeface="나눔바른고딕" pitchFamily="50" charset="-127"/>
                         </a:rPr>
                         <a:t>프로젝트</a:t>
+                      </a:r>
+                    </a:p>
+                  </a:txBody>
+                  <a:tcPr/>
+                </a:tc>
+                <a:tc>
+                  <a:txBody>
+                    <a:bodyPr/>
+                    <a:lstStyle/>
+                    <a:p>
+                      <a:pPr marL="0" marR="0" indent="0" algn="l" defTabSz="914400" rtl="0" eaLnBrk="1" fontAlgn="auto" latinLnBrk="1" hangingPunct="1">
+                        <a:lnSpc>
+                          <a:spcPct val="100000"/>
+                        </a:lnSpc>
+                        <a:spcBef>
+                          <a:spcPts val="0"/>
+                        </a:spcBef>
+                        <a:spcAft>
+                          <a:spcPts val="0"/>
+                        </a:spcAft>
+                        <a:buClr>
+                          <a:srgbClr val="000000"/>
+                        </a:buClr>
+                        <a:buSzTx/>
+                        <a:buFont typeface="Arial"/>
+                        <a:buNone/>
+                        <a:tabLst/>
+                        <a:defRPr/>
+                      </a:pPr>
+                      <a:r>
+                        <a:rPr lang="en-US" altLang="ko-KR" sz="800" b="0" i="0" u="none" strike="noStrike" cap="none" dirty="0" err="1" smtClean="0">
+                          <a:solidFill>
+                            <a:srgbClr val="000000"/>
+                          </a:solidFill>
+                          <a:latin typeface="Arial"/>
+                          <a:ea typeface="Arial"/>
+                          <a:cs typeface="Arial"/>
+                          <a:sym typeface="Arial"/>
+                        </a:rPr>
+                        <a:t>project_seq</a:t>
                       </a:r>
                       <a:endParaRPr lang="ko-KR" altLang="en-US" sz="800" dirty="0" smtClean="0">
                         <a:latin typeface="나눔바른고딕" pitchFamily="50" charset="-127"/>
@@ -38382,7 +38550,7 @@
                 </a:tc>
                 <a:extLst>
                   <a:ext uri="{0D108BD9-81ED-4DB2-BD59-A6C34878D82A}">
-                    <a16:rowId xmlns:a16="http://schemas.microsoft.com/office/drawing/2014/main" xmlns="" val="10004"/>
+                    <a16:rowId xmlns="" xmlns:a16="http://schemas.microsoft.com/office/drawing/2014/main" val="10004"/>
                   </a:ext>
                 </a:extLst>
               </a:tr>
@@ -38418,10 +38586,6 @@
                         </a:rPr>
                         <a:t>프로젝트 옵션</a:t>
                       </a:r>
-                      <a:endParaRPr lang="ko-KR" altLang="en-US" sz="800" dirty="0" smtClean="0">
-                        <a:latin typeface="나눔바른고딕" pitchFamily="50" charset="-127"/>
-                        <a:ea typeface="나눔바른고딕" pitchFamily="50" charset="-127"/>
-                      </a:endParaRPr>
                     </a:p>
                   </a:txBody>
                   <a:tcPr/>
@@ -38433,39 +38597,16 @@
                     <a:p>
                       <a:pPr latinLnBrk="1"/>
                       <a:r>
-                        <a:rPr lang="en-US" altLang="ko-KR" sz="800" dirty="0" smtClean="0">
-                          <a:latin typeface="나눔바른고딕" pitchFamily="50" charset="-127"/>
-                          <a:ea typeface="나눔바른고딕" pitchFamily="50" charset="-127"/>
-                        </a:rPr>
-                        <a:t>22000000</a:t>
-                      </a:r>
-                      <a:endParaRPr lang="ko-KR" altLang="en-US" sz="800" dirty="0">
-                        <a:latin typeface="나눔바른고딕" pitchFamily="50" charset="-127"/>
-                        <a:ea typeface="나눔바른고딕" pitchFamily="50" charset="-127"/>
-                      </a:endParaRPr>
-                    </a:p>
-                  </a:txBody>
-                  <a:tcPr/>
-                </a:tc>
-                <a:extLst>
-                  <a:ext uri="{0D108BD9-81ED-4DB2-BD59-A6C34878D82A}">
-                    <a16:rowId xmlns:a16="http://schemas.microsoft.com/office/drawing/2014/main" xmlns="" val="10005"/>
-                  </a:ext>
-                </a:extLst>
-              </a:tr>
-              <a:tr h="132977">
-                <a:tc>
-                  <a:txBody>
-                    <a:bodyPr/>
-                    <a:lstStyle/>
-                    <a:p>
-                      <a:pPr latinLnBrk="1"/>
-                      <a:r>
-                        <a:rPr lang="ko-KR" altLang="en-US" sz="800" dirty="0" smtClean="0">
-                          <a:latin typeface="나눔바른고딕" pitchFamily="50" charset="-127"/>
-                          <a:ea typeface="나눔바른고딕" pitchFamily="50" charset="-127"/>
-                        </a:rPr>
-                        <a:t>위험요소</a:t>
+                        <a:rPr lang="en-US" altLang="ko-KR" sz="800" b="0" i="0" u="none" strike="noStrike" cap="none" dirty="0" err="1" smtClean="0">
+                          <a:solidFill>
+                            <a:srgbClr val="000000"/>
+                          </a:solidFill>
+                          <a:latin typeface="Arial"/>
+                          <a:ea typeface="Arial"/>
+                          <a:cs typeface="Arial"/>
+                          <a:sym typeface="Arial"/>
+                        </a:rPr>
+                        <a:t>option_seq</a:t>
                       </a:r>
                       <a:endParaRPr lang="ko-KR" altLang="en-US" sz="800" dirty="0">
                         <a:latin typeface="나눔바른고딕" pitchFamily="50" charset="-127"/>
@@ -38486,7 +38627,7 @@
                           <a:latin typeface="나눔바른고딕" pitchFamily="50" charset="-127"/>
                           <a:ea typeface="나눔바른고딕" pitchFamily="50" charset="-127"/>
                         </a:rPr>
-                        <a:t>23000000</a:t>
+                        <a:t>22000000</a:t>
                       </a:r>
                       <a:endParaRPr lang="ko-KR" altLang="en-US" sz="800" dirty="0">
                         <a:latin typeface="나눔바른고딕" pitchFamily="50" charset="-127"/>
@@ -38498,11 +38639,11 @@
                 </a:tc>
                 <a:extLst>
                   <a:ext uri="{0D108BD9-81ED-4DB2-BD59-A6C34878D82A}">
-                    <a16:rowId xmlns:a16="http://schemas.microsoft.com/office/drawing/2014/main" xmlns="" val="10006"/>
+                    <a16:rowId xmlns="" xmlns:a16="http://schemas.microsoft.com/office/drawing/2014/main" val="10005"/>
                   </a:ext>
                 </a:extLst>
               </a:tr>
-              <a:tr h="0">
+              <a:tr h="132977">
                 <a:tc>
                   <a:txBody>
                     <a:bodyPr/>
@@ -38514,21 +38655,7 @@
                           <a:latin typeface="나눔바른고딕" pitchFamily="50" charset="-127"/>
                           <a:ea typeface="나눔바른고딕" pitchFamily="50" charset="-127"/>
                         </a:rPr>
-                        <a:t>프로젝트</a:t>
-                      </a:r>
-                      <a:r>
-                        <a:rPr lang="en-US" altLang="ko-KR" sz="800" dirty="0" smtClean="0">
-                          <a:latin typeface="나눔바른고딕" pitchFamily="50" charset="-127"/>
-                          <a:ea typeface="나눔바른고딕" pitchFamily="50" charset="-127"/>
-                        </a:rPr>
-                        <a:t>/</a:t>
-                      </a:r>
-                      <a:r>
-                        <a:rPr lang="ko-KR" altLang="en-US" sz="800" dirty="0" smtClean="0">
-                          <a:latin typeface="나눔바른고딕" pitchFamily="50" charset="-127"/>
-                          <a:ea typeface="나눔바른고딕" pitchFamily="50" charset="-127"/>
-                        </a:rPr>
-                        <a:t>스토어 문의</a:t>
+                        <a:t>위험요소</a:t>
                       </a:r>
                       <a:endParaRPr lang="ko-KR" altLang="en-US" sz="800" dirty="0">
                         <a:latin typeface="나눔바른고딕" pitchFamily="50" charset="-127"/>
@@ -38545,39 +38672,16 @@
                     <a:p>
                       <a:pPr latinLnBrk="1"/>
                       <a:r>
-                        <a:rPr lang="en-US" altLang="ko-KR" sz="800" dirty="0" smtClean="0">
-                          <a:latin typeface="나눔바른고딕" pitchFamily="50" charset="-127"/>
-                          <a:ea typeface="나눔바른고딕" pitchFamily="50" charset="-127"/>
-                        </a:rPr>
-                        <a:t>24000000</a:t>
-                      </a:r>
-                      <a:endParaRPr lang="ko-KR" altLang="en-US" sz="800" dirty="0">
-                        <a:latin typeface="나눔바른고딕" pitchFamily="50" charset="-127"/>
-                        <a:ea typeface="나눔바른고딕" pitchFamily="50" charset="-127"/>
-                      </a:endParaRPr>
-                    </a:p>
-                  </a:txBody>
-                  <a:tcPr/>
-                </a:tc>
-                <a:extLst>
-                  <a:ext uri="{0D108BD9-81ED-4DB2-BD59-A6C34878D82A}">
-                    <a16:rowId xmlns:a16="http://schemas.microsoft.com/office/drawing/2014/main" xmlns="" val="10007"/>
-                  </a:ext>
-                </a:extLst>
-              </a:tr>
-              <a:tr h="0">
-                <a:tc>
-                  <a:txBody>
-                    <a:bodyPr/>
-                    <a:lstStyle/>
-                    <a:p>
-                      <a:pPr latinLnBrk="1"/>
-                      <a:r>
-                        <a:rPr lang="ko-KR" altLang="en-US" sz="800" dirty="0" err="1" smtClean="0">
-                          <a:latin typeface="나눔바른고딕" pitchFamily="50" charset="-127"/>
-                          <a:ea typeface="나눔바른고딕" pitchFamily="50" charset="-127"/>
-                        </a:rPr>
-                        <a:t>펀딩</a:t>
+                        <a:rPr lang="en-US" altLang="ko-KR" sz="800" b="0" i="0" u="none" strike="noStrike" cap="none" dirty="0" err="1" smtClean="0">
+                          <a:solidFill>
+                            <a:srgbClr val="000000"/>
+                          </a:solidFill>
+                          <a:latin typeface="Arial"/>
+                          <a:ea typeface="Arial"/>
+                          <a:cs typeface="Arial"/>
+                          <a:sym typeface="Arial"/>
+                        </a:rPr>
+                        <a:t>risk_seq</a:t>
                       </a:r>
                       <a:endParaRPr lang="ko-KR" altLang="en-US" sz="800" dirty="0">
                         <a:latin typeface="나눔바른고딕" pitchFamily="50" charset="-127"/>
@@ -38598,7 +38702,7 @@
                           <a:latin typeface="나눔바른고딕" pitchFamily="50" charset="-127"/>
                           <a:ea typeface="나눔바른고딕" pitchFamily="50" charset="-127"/>
                         </a:rPr>
-                        <a:t>25000000</a:t>
+                        <a:t>23000000</a:t>
                       </a:r>
                       <a:endParaRPr lang="ko-KR" altLang="en-US" sz="800" dirty="0">
                         <a:latin typeface="나눔바른고딕" pitchFamily="50" charset="-127"/>
@@ -38610,7 +38714,7 @@
                 </a:tc>
                 <a:extLst>
                   <a:ext uri="{0D108BD9-81ED-4DB2-BD59-A6C34878D82A}">
-                    <a16:rowId xmlns:a16="http://schemas.microsoft.com/office/drawing/2014/main" xmlns="" val="10008"/>
+                    <a16:rowId xmlns="" xmlns:a16="http://schemas.microsoft.com/office/drawing/2014/main" val="10006"/>
                   </a:ext>
                 </a:extLst>
               </a:tr>
@@ -38622,11 +38726,25 @@
                     <a:p>
                       <a:pPr latinLnBrk="1"/>
                       <a:r>
-                        <a:rPr lang="ko-KR" altLang="en-US" sz="800" dirty="0" err="1" smtClean="0">
-                          <a:latin typeface="나눔바른고딕" pitchFamily="50" charset="-127"/>
-                          <a:ea typeface="나눔바른고딕" pitchFamily="50" charset="-127"/>
-                        </a:rPr>
-                        <a:t>리워드스토어</a:t>
+                        <a:rPr lang="ko-KR" altLang="en-US" sz="800" dirty="0" smtClean="0">
+                          <a:latin typeface="나눔바른고딕" pitchFamily="50" charset="-127"/>
+                          <a:ea typeface="나눔바른고딕" pitchFamily="50" charset="-127"/>
+                        </a:rPr>
+                        <a:t>프로젝트</a:t>
+                      </a:r>
+                      <a:r>
+                        <a:rPr lang="en-US" altLang="ko-KR" sz="800" dirty="0" smtClean="0">
+                          <a:latin typeface="나눔바른고딕" pitchFamily="50" charset="-127"/>
+                          <a:ea typeface="나눔바른고딕" pitchFamily="50" charset="-127"/>
+                        </a:rPr>
+                        <a:t>/</a:t>
+                      </a:r>
+                      <a:r>
+                        <a:rPr lang="ko-KR" altLang="en-US" sz="800" dirty="0" smtClean="0">
+                          <a:latin typeface="나눔바른고딕" pitchFamily="50" charset="-127"/>
+                          <a:ea typeface="나눔바른고딕" pitchFamily="50" charset="-127"/>
+                        </a:rPr>
+                        <a:t>스토어 문의</a:t>
                       </a:r>
                       <a:endParaRPr lang="ko-KR" altLang="en-US" sz="800" dirty="0">
                         <a:latin typeface="나눔바른고딕" pitchFamily="50" charset="-127"/>
@@ -38643,46 +38761,16 @@
                     <a:p>
                       <a:pPr latinLnBrk="1"/>
                       <a:r>
-                        <a:rPr lang="en-US" altLang="ko-KR" sz="800" dirty="0" smtClean="0">
-                          <a:latin typeface="나눔바른고딕" pitchFamily="50" charset="-127"/>
-                          <a:ea typeface="나눔바른고딕" pitchFamily="50" charset="-127"/>
-                        </a:rPr>
-                        <a:t>31000000</a:t>
-                      </a:r>
-                      <a:endParaRPr lang="ko-KR" altLang="en-US" sz="800" dirty="0">
-                        <a:latin typeface="나눔바른고딕" pitchFamily="50" charset="-127"/>
-                        <a:ea typeface="나눔바른고딕" pitchFamily="50" charset="-127"/>
-                      </a:endParaRPr>
-                    </a:p>
-                  </a:txBody>
-                  <a:tcPr/>
-                </a:tc>
-                <a:extLst>
-                  <a:ext uri="{0D108BD9-81ED-4DB2-BD59-A6C34878D82A}">
-                    <a16:rowId xmlns:a16="http://schemas.microsoft.com/office/drawing/2014/main" xmlns="" val="10009"/>
-                  </a:ext>
-                </a:extLst>
-              </a:tr>
-              <a:tr h="0">
-                <a:tc>
-                  <a:txBody>
-                    <a:bodyPr/>
-                    <a:lstStyle/>
-                    <a:p>
-                      <a:pPr latinLnBrk="1"/>
-                      <a:r>
-                        <a:rPr lang="ko-KR" altLang="en-US" sz="800" dirty="0" err="1" smtClean="0">
-                          <a:latin typeface="나눔바른고딕" pitchFamily="50" charset="-127"/>
-                          <a:ea typeface="나눔바른고딕" pitchFamily="50" charset="-127"/>
-                        </a:rPr>
-                        <a:t>리워드스토어</a:t>
-                      </a:r>
-                      <a:r>
-                        <a:rPr lang="ko-KR" altLang="en-US" sz="800" dirty="0" smtClean="0">
-                          <a:latin typeface="나눔바른고딕" pitchFamily="50" charset="-127"/>
-                          <a:ea typeface="나눔바른고딕" pitchFamily="50" charset="-127"/>
-                        </a:rPr>
-                        <a:t> 옵션</a:t>
+                        <a:rPr lang="en-US" altLang="ko-KR" sz="800" b="0" i="0" u="none" strike="noStrike" cap="none" dirty="0" err="1" smtClean="0">
+                          <a:solidFill>
+                            <a:srgbClr val="000000"/>
+                          </a:solidFill>
+                          <a:latin typeface="Arial"/>
+                          <a:ea typeface="Arial"/>
+                          <a:cs typeface="Arial"/>
+                          <a:sym typeface="Arial"/>
+                        </a:rPr>
+                        <a:t>qna_seq</a:t>
                       </a:r>
                       <a:endParaRPr lang="ko-KR" altLang="en-US" sz="800" dirty="0">
                         <a:latin typeface="나눔바른고딕" pitchFamily="50" charset="-127"/>
@@ -38703,7 +38791,7 @@
                           <a:latin typeface="나눔바른고딕" pitchFamily="50" charset="-127"/>
                           <a:ea typeface="나눔바른고딕" pitchFamily="50" charset="-127"/>
                         </a:rPr>
-                        <a:t>32000000</a:t>
+                        <a:t>24000000</a:t>
                       </a:r>
                       <a:endParaRPr lang="ko-KR" altLang="en-US" sz="800" dirty="0">
                         <a:latin typeface="나눔바른고딕" pitchFamily="50" charset="-127"/>
@@ -38715,7 +38803,7 @@
                 </a:tc>
                 <a:extLst>
                   <a:ext uri="{0D108BD9-81ED-4DB2-BD59-A6C34878D82A}">
-                    <a16:rowId xmlns:a16="http://schemas.microsoft.com/office/drawing/2014/main" xmlns="" val="10010"/>
+                    <a16:rowId xmlns="" xmlns:a16="http://schemas.microsoft.com/office/drawing/2014/main" val="10007"/>
                   </a:ext>
                 </a:extLst>
               </a:tr>
@@ -38731,14 +38819,7 @@
                           <a:latin typeface="나눔바른고딕" pitchFamily="50" charset="-127"/>
                           <a:ea typeface="나눔바른고딕" pitchFamily="50" charset="-127"/>
                         </a:rPr>
-                        <a:t>리워드스토어</a:t>
-                      </a:r>
-                      <a:r>
-                        <a:rPr lang="ko-KR" altLang="en-US" sz="800" dirty="0" smtClean="0">
-                          <a:latin typeface="나눔바른고딕" pitchFamily="50" charset="-127"/>
-                          <a:ea typeface="나눔바른고딕" pitchFamily="50" charset="-127"/>
-                        </a:rPr>
-                        <a:t> 주문</a:t>
+                        <a:t>펀딩</a:t>
                       </a:r>
                       <a:endParaRPr lang="ko-KR" altLang="en-US" sz="800" dirty="0">
                         <a:latin typeface="나눔바른고딕" pitchFamily="50" charset="-127"/>
@@ -38755,11 +38836,37 @@
                     <a:p>
                       <a:pPr latinLnBrk="1"/>
                       <a:r>
+                        <a:rPr lang="en-US" altLang="ko-KR" sz="800" b="0" i="0" u="none" strike="noStrike" cap="none" dirty="0" err="1" smtClean="0">
+                          <a:solidFill>
+                            <a:srgbClr val="000000"/>
+                          </a:solidFill>
+                          <a:latin typeface="Arial"/>
+                          <a:ea typeface="Arial"/>
+                          <a:cs typeface="Arial"/>
+                          <a:sym typeface="Arial"/>
+                        </a:rPr>
+                        <a:t>funding_seq</a:t>
+                      </a:r>
+                      <a:endParaRPr lang="ko-KR" altLang="en-US" sz="800" dirty="0">
+                        <a:latin typeface="나눔바른고딕" pitchFamily="50" charset="-127"/>
+                        <a:ea typeface="나눔바른고딕" pitchFamily="50" charset="-127"/>
+                      </a:endParaRPr>
+                    </a:p>
+                  </a:txBody>
+                  <a:tcPr/>
+                </a:tc>
+                <a:tc>
+                  <a:txBody>
+                    <a:bodyPr/>
+                    <a:lstStyle/>
+                    <a:p>
+                      <a:pPr latinLnBrk="1"/>
+                      <a:r>
                         <a:rPr lang="en-US" altLang="ko-KR" sz="800" dirty="0" smtClean="0">
                           <a:latin typeface="나눔바른고딕" pitchFamily="50" charset="-127"/>
                           <a:ea typeface="나눔바른고딕" pitchFamily="50" charset="-127"/>
                         </a:rPr>
-                        <a:t>33000000</a:t>
+                        <a:t>25000000</a:t>
                       </a:r>
                       <a:endParaRPr lang="ko-KR" altLang="en-US" sz="800" dirty="0">
                         <a:latin typeface="나눔바른고딕" pitchFamily="50" charset="-127"/>
@@ -38771,7 +38878,246 @@
                 </a:tc>
                 <a:extLst>
                   <a:ext uri="{0D108BD9-81ED-4DB2-BD59-A6C34878D82A}">
-                    <a16:rowId xmlns:a16="http://schemas.microsoft.com/office/drawing/2014/main" xmlns="" val="10011"/>
+                    <a16:rowId xmlns="" xmlns:a16="http://schemas.microsoft.com/office/drawing/2014/main" val="10008"/>
+                  </a:ext>
+                </a:extLst>
+              </a:tr>
+              <a:tr h="0">
+                <a:tc>
+                  <a:txBody>
+                    <a:bodyPr/>
+                    <a:lstStyle/>
+                    <a:p>
+                      <a:pPr latinLnBrk="1"/>
+                      <a:r>
+                        <a:rPr lang="ko-KR" altLang="en-US" sz="800" dirty="0" err="1" smtClean="0">
+                          <a:latin typeface="나눔바른고딕" pitchFamily="50" charset="-127"/>
+                          <a:ea typeface="나눔바른고딕" pitchFamily="50" charset="-127"/>
+                        </a:rPr>
+                        <a:t>리워드스토어</a:t>
+                      </a:r>
+                      <a:endParaRPr lang="ko-KR" altLang="en-US" sz="800" dirty="0">
+                        <a:latin typeface="나눔바른고딕" pitchFamily="50" charset="-127"/>
+                        <a:ea typeface="나눔바른고딕" pitchFamily="50" charset="-127"/>
+                      </a:endParaRPr>
+                    </a:p>
+                  </a:txBody>
+                  <a:tcPr/>
+                </a:tc>
+                <a:tc>
+                  <a:txBody>
+                    <a:bodyPr/>
+                    <a:lstStyle/>
+                    <a:p>
+                      <a:pPr latinLnBrk="1"/>
+                      <a:r>
+                        <a:rPr lang="en-US" altLang="ko-KR" sz="800" b="0" i="0" u="none" strike="noStrike" cap="none" dirty="0" err="1" smtClean="0">
+                          <a:solidFill>
+                            <a:srgbClr val="000000"/>
+                          </a:solidFill>
+                          <a:latin typeface="Arial"/>
+                          <a:ea typeface="Arial"/>
+                          <a:cs typeface="Arial"/>
+                          <a:sym typeface="Arial"/>
+                        </a:rPr>
+                        <a:t>store_seq</a:t>
+                      </a:r>
+                      <a:endParaRPr lang="ko-KR" altLang="en-US" sz="800" dirty="0">
+                        <a:latin typeface="나눔바른고딕" pitchFamily="50" charset="-127"/>
+                        <a:ea typeface="나눔바른고딕" pitchFamily="50" charset="-127"/>
+                      </a:endParaRPr>
+                    </a:p>
+                  </a:txBody>
+                  <a:tcPr/>
+                </a:tc>
+                <a:tc>
+                  <a:txBody>
+                    <a:bodyPr/>
+                    <a:lstStyle/>
+                    <a:p>
+                      <a:pPr latinLnBrk="1"/>
+                      <a:r>
+                        <a:rPr lang="en-US" altLang="ko-KR" sz="800" dirty="0" smtClean="0">
+                          <a:latin typeface="나눔바른고딕" pitchFamily="50" charset="-127"/>
+                          <a:ea typeface="나눔바른고딕" pitchFamily="50" charset="-127"/>
+                        </a:rPr>
+                        <a:t>31000000</a:t>
+                      </a:r>
+                      <a:endParaRPr lang="ko-KR" altLang="en-US" sz="800" dirty="0">
+                        <a:latin typeface="나눔바른고딕" pitchFamily="50" charset="-127"/>
+                        <a:ea typeface="나눔바른고딕" pitchFamily="50" charset="-127"/>
+                      </a:endParaRPr>
+                    </a:p>
+                  </a:txBody>
+                  <a:tcPr/>
+                </a:tc>
+                <a:extLst>
+                  <a:ext uri="{0D108BD9-81ED-4DB2-BD59-A6C34878D82A}">
+                    <a16:rowId xmlns="" xmlns:a16="http://schemas.microsoft.com/office/drawing/2014/main" val="10009"/>
+                  </a:ext>
+                </a:extLst>
+              </a:tr>
+              <a:tr h="0">
+                <a:tc>
+                  <a:txBody>
+                    <a:bodyPr/>
+                    <a:lstStyle/>
+                    <a:p>
+                      <a:pPr latinLnBrk="1"/>
+                      <a:r>
+                        <a:rPr lang="ko-KR" altLang="en-US" sz="800" dirty="0" err="1" smtClean="0">
+                          <a:latin typeface="나눔바른고딕" pitchFamily="50" charset="-127"/>
+                          <a:ea typeface="나눔바른고딕" pitchFamily="50" charset="-127"/>
+                        </a:rPr>
+                        <a:t>리워드스토어</a:t>
+                      </a:r>
+                      <a:r>
+                        <a:rPr lang="ko-KR" altLang="en-US" sz="800" dirty="0" smtClean="0">
+                          <a:latin typeface="나눔바른고딕" pitchFamily="50" charset="-127"/>
+                          <a:ea typeface="나눔바른고딕" pitchFamily="50" charset="-127"/>
+                        </a:rPr>
+                        <a:t> 옵션</a:t>
+                      </a:r>
+                      <a:endParaRPr lang="ko-KR" altLang="en-US" sz="800" dirty="0">
+                        <a:latin typeface="나눔바른고딕" pitchFamily="50" charset="-127"/>
+                        <a:ea typeface="나눔바른고딕" pitchFamily="50" charset="-127"/>
+                      </a:endParaRPr>
+                    </a:p>
+                  </a:txBody>
+                  <a:tcPr/>
+                </a:tc>
+                <a:tc>
+                  <a:txBody>
+                    <a:bodyPr/>
+                    <a:lstStyle/>
+                    <a:p>
+                      <a:pPr latinLnBrk="1"/>
+                      <a:r>
+                        <a:rPr lang="en-US" altLang="ko-KR" sz="800" b="0" i="0" u="none" strike="noStrike" cap="none" dirty="0" err="1" smtClean="0">
+                          <a:solidFill>
+                            <a:srgbClr val="000000"/>
+                          </a:solidFill>
+                          <a:latin typeface="Arial"/>
+                          <a:ea typeface="Arial"/>
+                          <a:cs typeface="Arial"/>
+                          <a:sym typeface="Arial"/>
+                        </a:rPr>
+                        <a:t>store_option_seq</a:t>
+                      </a:r>
+                      <a:endParaRPr lang="ko-KR" altLang="en-US" sz="800" dirty="0">
+                        <a:latin typeface="나눔바른고딕" pitchFamily="50" charset="-127"/>
+                        <a:ea typeface="나눔바른고딕" pitchFamily="50" charset="-127"/>
+                      </a:endParaRPr>
+                    </a:p>
+                  </a:txBody>
+                  <a:tcPr/>
+                </a:tc>
+                <a:tc>
+                  <a:txBody>
+                    <a:bodyPr/>
+                    <a:lstStyle/>
+                    <a:p>
+                      <a:pPr latinLnBrk="1"/>
+                      <a:r>
+                        <a:rPr lang="en-US" altLang="ko-KR" sz="800" dirty="0" smtClean="0">
+                          <a:latin typeface="나눔바른고딕" pitchFamily="50" charset="-127"/>
+                          <a:ea typeface="나눔바른고딕" pitchFamily="50" charset="-127"/>
+                        </a:rPr>
+                        <a:t>32000000</a:t>
+                      </a:r>
+                      <a:endParaRPr lang="ko-KR" altLang="en-US" sz="800" dirty="0">
+                        <a:latin typeface="나눔바른고딕" pitchFamily="50" charset="-127"/>
+                        <a:ea typeface="나눔바른고딕" pitchFamily="50" charset="-127"/>
+                      </a:endParaRPr>
+                    </a:p>
+                  </a:txBody>
+                  <a:tcPr/>
+                </a:tc>
+                <a:extLst>
+                  <a:ext uri="{0D108BD9-81ED-4DB2-BD59-A6C34878D82A}">
+                    <a16:rowId xmlns="" xmlns:a16="http://schemas.microsoft.com/office/drawing/2014/main" val="10010"/>
+                  </a:ext>
+                </a:extLst>
+              </a:tr>
+              <a:tr h="0">
+                <a:tc>
+                  <a:txBody>
+                    <a:bodyPr/>
+                    <a:lstStyle/>
+                    <a:p>
+                      <a:pPr latinLnBrk="1"/>
+                      <a:r>
+                        <a:rPr lang="ko-KR" altLang="en-US" sz="800" dirty="0" err="1" smtClean="0">
+                          <a:latin typeface="나눔바른고딕" pitchFamily="50" charset="-127"/>
+                          <a:ea typeface="나눔바른고딕" pitchFamily="50" charset="-127"/>
+                        </a:rPr>
+                        <a:t>리워드스토어</a:t>
+                      </a:r>
+                      <a:r>
+                        <a:rPr lang="ko-KR" altLang="en-US" sz="800" dirty="0" smtClean="0">
+                          <a:latin typeface="나눔바른고딕" pitchFamily="50" charset="-127"/>
+                          <a:ea typeface="나눔바른고딕" pitchFamily="50" charset="-127"/>
+                        </a:rPr>
+                        <a:t> 주문</a:t>
+                      </a:r>
+                      <a:endParaRPr lang="ko-KR" altLang="en-US" sz="800" dirty="0">
+                        <a:latin typeface="나눔바른고딕" pitchFamily="50" charset="-127"/>
+                        <a:ea typeface="나눔바른고딕" pitchFamily="50" charset="-127"/>
+                      </a:endParaRPr>
+                    </a:p>
+                  </a:txBody>
+                  <a:tcPr/>
+                </a:tc>
+                <a:tc>
+                  <a:txBody>
+                    <a:bodyPr/>
+                    <a:lstStyle/>
+                    <a:p>
+                      <a:pPr latinLnBrk="1"/>
+                      <a:r>
+                        <a:rPr lang="en-US" altLang="ko-KR" sz="800" b="0" i="0" u="none" strike="noStrike" cap="none" dirty="0" err="1" smtClean="0">
+                          <a:solidFill>
+                            <a:srgbClr val="000000"/>
+                          </a:solidFill>
+                          <a:latin typeface="Arial"/>
+                          <a:ea typeface="Arial"/>
+                          <a:cs typeface="Arial"/>
+                          <a:sym typeface="Arial"/>
+                        </a:rPr>
+                        <a:t>store_order_seq</a:t>
+                      </a:r>
+                      <a:endParaRPr lang="ko-KR" altLang="en-US" sz="800" dirty="0">
+                        <a:latin typeface="나눔바른고딕" pitchFamily="50" charset="-127"/>
+                        <a:ea typeface="나눔바른고딕" pitchFamily="50" charset="-127"/>
+                      </a:endParaRPr>
+                    </a:p>
+                  </a:txBody>
+                  <a:tcPr/>
+                </a:tc>
+                <a:tc>
+                  <a:txBody>
+                    <a:bodyPr/>
+                    <a:lstStyle/>
+                    <a:p>
+                      <a:pPr latinLnBrk="1"/>
+                      <a:r>
+                        <a:rPr lang="en-US" altLang="ko-KR" sz="800" dirty="0" smtClean="0">
+                          <a:latin typeface="나눔바른고딕" pitchFamily="50" charset="-127"/>
+                          <a:ea typeface="나눔바른고딕" pitchFamily="50" charset="-127"/>
+                        </a:rPr>
+                        <a:t>33000000</a:t>
+                      </a:r>
+                      <a:endParaRPr lang="ko-KR" altLang="en-US" sz="800" dirty="0">
+                        <a:latin typeface="나눔바른고딕" pitchFamily="50" charset="-127"/>
+                        <a:ea typeface="나눔바른고딕" pitchFamily="50" charset="-127"/>
+                      </a:endParaRPr>
+                    </a:p>
+                  </a:txBody>
+                  <a:tcPr/>
+                </a:tc>
+                <a:extLst>
+                  <a:ext uri="{0D108BD9-81ED-4DB2-BD59-A6C34878D82A}">
+                    <a16:rowId xmlns="" xmlns:a16="http://schemas.microsoft.com/office/drawing/2014/main" val="10011"/>
                   </a:ext>
                 </a:extLst>
               </a:tr>
@@ -38788,6 +39134,32 @@
                           <a:ea typeface="나눔바른고딕" pitchFamily="50" charset="-127"/>
                         </a:rPr>
                         <a:t>신고</a:t>
+                      </a:r>
+                      <a:endParaRPr lang="ko-KR" altLang="en-US" sz="800" dirty="0">
+                        <a:latin typeface="나눔바른고딕" pitchFamily="50" charset="-127"/>
+                        <a:ea typeface="나눔바른고딕" pitchFamily="50" charset="-127"/>
+                      </a:endParaRPr>
+                    </a:p>
+                  </a:txBody>
+                  <a:tcPr/>
+                </a:tc>
+                <a:tc>
+                  <a:txBody>
+                    <a:bodyPr/>
+                    <a:lstStyle/>
+                    <a:p>
+                      <a:pPr latinLnBrk="1"/>
+                      <a:r>
+                        <a:rPr lang="en-US" altLang="ko-KR" sz="800" b="0" i="0" u="none" strike="noStrike" cap="none" dirty="0" err="1" smtClean="0">
+                          <a:solidFill>
+                            <a:srgbClr val="000000"/>
+                          </a:solidFill>
+                          <a:latin typeface="Arial"/>
+                          <a:ea typeface="Arial"/>
+                          <a:cs typeface="Arial"/>
+                          <a:sym typeface="Arial"/>
+                        </a:rPr>
+                        <a:t>report_seq</a:t>
                       </a:r>
                       <a:endParaRPr lang="ko-KR" altLang="en-US" sz="800" dirty="0">
                         <a:latin typeface="나눔바른고딕" pitchFamily="50" charset="-127"/>
@@ -38848,6 +39220,32 @@
                     <a:p>
                       <a:pPr latinLnBrk="1"/>
                       <a:r>
+                        <a:rPr lang="en-US" altLang="ko-KR" sz="800" b="0" i="0" u="none" strike="noStrike" cap="none" dirty="0" err="1" smtClean="0">
+                          <a:solidFill>
+                            <a:srgbClr val="000000"/>
+                          </a:solidFill>
+                          <a:latin typeface="Arial"/>
+                          <a:ea typeface="Arial"/>
+                          <a:cs typeface="Arial"/>
+                          <a:sym typeface="Arial"/>
+                        </a:rPr>
+                        <a:t>rtqna_seq</a:t>
+                      </a:r>
+                      <a:endParaRPr lang="ko-KR" altLang="en-US" sz="800" dirty="0">
+                        <a:latin typeface="나눔바른고딕" pitchFamily="50" charset="-127"/>
+                        <a:ea typeface="나눔바른고딕" pitchFamily="50" charset="-127"/>
+                      </a:endParaRPr>
+                    </a:p>
+                  </a:txBody>
+                  <a:tcPr/>
+                </a:tc>
+                <a:tc>
+                  <a:txBody>
+                    <a:bodyPr/>
+                    <a:lstStyle/>
+                    <a:p>
+                      <a:pPr latinLnBrk="1"/>
+                      <a:r>
                         <a:rPr lang="en-US" altLang="ko-KR" sz="800" dirty="0" smtClean="0">
                           <a:latin typeface="나눔바른고딕" pitchFamily="50" charset="-127"/>
                           <a:ea typeface="나눔바른고딕" pitchFamily="50" charset="-127"/>
@@ -38892,6 +39290,32 @@
                     <a:p>
                       <a:pPr latinLnBrk="1"/>
                       <a:r>
+                        <a:rPr lang="en-US" altLang="ko-KR" sz="800" b="0" i="0" u="none" strike="noStrike" cap="none" dirty="0" err="1" smtClean="0">
+                          <a:solidFill>
+                            <a:srgbClr val="000000"/>
+                          </a:solidFill>
+                          <a:latin typeface="Arial"/>
+                          <a:ea typeface="Arial"/>
+                          <a:cs typeface="Arial"/>
+                          <a:sym typeface="Arial"/>
+                        </a:rPr>
+                        <a:t>notice_seq</a:t>
+                      </a:r>
+                      <a:endParaRPr lang="ko-KR" altLang="en-US" sz="800" dirty="0">
+                        <a:latin typeface="나눔바른고딕" pitchFamily="50" charset="-127"/>
+                        <a:ea typeface="나눔바른고딕" pitchFamily="50" charset="-127"/>
+                      </a:endParaRPr>
+                    </a:p>
+                  </a:txBody>
+                  <a:tcPr/>
+                </a:tc>
+                <a:tc>
+                  <a:txBody>
+                    <a:bodyPr/>
+                    <a:lstStyle/>
+                    <a:p>
+                      <a:pPr latinLnBrk="1"/>
+                      <a:r>
                         <a:rPr lang="en-US" altLang="ko-KR" sz="800" dirty="0" smtClean="0">
                           <a:latin typeface="나눔바른고딕" pitchFamily="50" charset="-127"/>
                           <a:ea typeface="나눔바른고딕" pitchFamily="50" charset="-127"/>
@@ -38920,6 +39344,32 @@
                           <a:ea typeface="나눔바른고딕" pitchFamily="50" charset="-127"/>
                         </a:rPr>
                         <a:t>FAQ</a:t>
+                      </a:r>
+                      <a:endParaRPr lang="ko-KR" altLang="en-US" sz="800" dirty="0">
+                        <a:latin typeface="나눔바른고딕" pitchFamily="50" charset="-127"/>
+                        <a:ea typeface="나눔바른고딕" pitchFamily="50" charset="-127"/>
+                      </a:endParaRPr>
+                    </a:p>
+                  </a:txBody>
+                  <a:tcPr/>
+                </a:tc>
+                <a:tc>
+                  <a:txBody>
+                    <a:bodyPr/>
+                    <a:lstStyle/>
+                    <a:p>
+                      <a:pPr latinLnBrk="1"/>
+                      <a:r>
+                        <a:rPr lang="en-US" altLang="ko-KR" sz="800" b="0" i="0" u="none" strike="noStrike" cap="none" dirty="0" err="1" smtClean="0">
+                          <a:solidFill>
+                            <a:srgbClr val="000000"/>
+                          </a:solidFill>
+                          <a:latin typeface="Arial"/>
+                          <a:ea typeface="Arial"/>
+                          <a:cs typeface="Arial"/>
+                          <a:sym typeface="Arial"/>
+                        </a:rPr>
+                        <a:t>faq_seq</a:t>
                       </a:r>
                       <a:endParaRPr lang="ko-KR" altLang="en-US" sz="800" dirty="0">
                         <a:latin typeface="나눔바른고딕" pitchFamily="50" charset="-127"/>

</xml_diff>